<commit_message>
add poster title, problem statent and objectives
</commit_message>
<xml_diff>
--- a/poster.pptx
+++ b/poster.pptx
@@ -112,10 +112,21 @@
   </p:defaultTextStyle>
   <p:extLst>
     <p:ext uri="{EFAFB233-063F-42B5-8137-9DF3F51BA10A}">
-      <p15:sldGuideLst xmlns:p15="http://schemas.microsoft.com/office/powerpoint/2012/main" xmlns=""/>
+      <p15:sldGuideLst xmlns:p15="http://schemas.microsoft.com/office/powerpoint/2012/main">
+        <p15:guide id="1" orient="horz" pos="10368">
+          <p15:clr>
+            <a:srgbClr val="A4A3A4"/>
+          </p15:clr>
+        </p15:guide>
+        <p15:guide id="2" pos="13824">
+          <p15:clr>
+            <a:srgbClr val="A4A3A4"/>
+          </p15:clr>
+        </p15:guide>
+      </p15:sldGuideLst>
     </p:ext>
     <p:ext uri="{2D200454-40CA-4A62-9FC3-DE9A4176ACB9}">
-      <p15:notesGuideLst xmlns:p15="http://schemas.microsoft.com/office/powerpoint/2012/main" xmlns=""/>
+      <p15:notesGuideLst xmlns:p15="http://schemas.microsoft.com/office/powerpoint/2012/main"/>
     </p:ext>
   </p:extLst>
 </p:presentation>
@@ -297,7 +308,7 @@
                   <c:v>2.4</c:v>
                 </c:pt>
                 <c:pt idx="1">
-                  <c:v>4.4</c:v>
+                  <c:v>4.4000000000000004</c:v>
                 </c:pt>
                 <c:pt idx="2">
                   <c:v>1.8</c:v>
@@ -362,16 +373,16 @@
                 <c:formatCode>General</c:formatCode>
                 <c:ptCount val="4"/>
                 <c:pt idx="0">
-                  <c:v>2.0</c:v>
+                  <c:v>2</c:v>
                 </c:pt>
                 <c:pt idx="1">
-                  <c:v>2.0</c:v>
+                  <c:v>2</c:v>
                 </c:pt>
                 <c:pt idx="2">
-                  <c:v>3.0</c:v>
+                  <c:v>3</c:v>
                 </c:pt>
                 <c:pt idx="3">
-                  <c:v>5.0</c:v>
+                  <c:v>5</c:v>
                 </c:pt>
               </c:numCache>
             </c:numRef>
@@ -387,11 +398,11 @@
         </c:dLbls>
         <c:gapWidth val="80"/>
         <c:overlap val="25"/>
-        <c:axId val="2105468216"/>
-        <c:axId val="2105468728"/>
+        <c:axId val="308085608"/>
+        <c:axId val="308086784"/>
       </c:barChart>
       <c:catAx>
-        <c:axId val="2105468216"/>
+        <c:axId val="308085608"/>
         <c:scaling>
           <c:orientation val="minMax"/>
         </c:scaling>
@@ -434,7 +445,7 @@
             <a:endParaRPr lang="en-US"/>
           </a:p>
         </c:txPr>
-        <c:crossAx val="2105468728"/>
+        <c:crossAx val="308086784"/>
         <c:crosses val="autoZero"/>
         <c:auto val="1"/>
         <c:lblAlgn val="ctr"/>
@@ -442,7 +453,7 @@
         <c:noMultiLvlLbl val="0"/>
       </c:catAx>
       <c:valAx>
-        <c:axId val="2105468728"/>
+        <c:axId val="308086784"/>
         <c:scaling>
           <c:orientation val="minMax"/>
         </c:scaling>
@@ -493,7 +504,7 @@
             <a:endParaRPr lang="en-US"/>
           </a:p>
         </c:txPr>
-        <c:crossAx val="2105468216"/>
+        <c:crossAx val="308085608"/>
         <c:crosses val="autoZero"/>
         <c:crossBetween val="between"/>
       </c:valAx>
@@ -558,7 +569,7 @@
       <a:endParaRPr lang="en-US"/>
     </a:p>
   </c:txPr>
-  <c:externalData r:id="rId1">
+  <c:externalData r:id="rId3">
     <c:autoUpdate val="0"/>
   </c:externalData>
 </c:chartSpace>
@@ -4452,12 +4463,12 @@
         </a:fontRef>
       </dsp:style>
       <dsp:txBody>
-        <a:bodyPr spcFirstLastPara="0" vert="horz" wrap="square" lIns="73660" tIns="73660" rIns="73660" bIns="73660" numCol="1" spcCol="1270" anchor="ctr" anchorCtr="0">
+        <a:bodyPr spcFirstLastPara="0" vert="horz" wrap="square" lIns="76200" tIns="76200" rIns="76200" bIns="76200" numCol="1" spcCol="1270" anchor="ctr" anchorCtr="0">
           <a:noAutofit/>
         </a:bodyPr>
         <a:lstStyle/>
         <a:p>
-          <a:pPr lvl="0" algn="ctr" defTabSz="1289050">
+          <a:pPr lvl="0" algn="ctr" defTabSz="1333500">
             <a:lnSpc>
               <a:spcPct val="90000"/>
             </a:lnSpc>
@@ -4469,10 +4480,10 @@
             </a:spcAft>
           </a:pPr>
           <a:r>
-            <a:rPr lang="en-US" sz="2900" kern="1200" dirty="0" smtClean="0"/>
+            <a:rPr lang="en-US" sz="3000" kern="1200" dirty="0" smtClean="0"/>
             <a:t>Step 1</a:t>
           </a:r>
-          <a:endParaRPr lang="en-US" sz="2900" kern="1200" dirty="0"/>
+          <a:endParaRPr lang="en-US" sz="3000" kern="1200" dirty="0"/>
         </a:p>
       </dsp:txBody>
       <dsp:txXfrm>
@@ -4694,12 +4705,12 @@
         </a:fontRef>
       </dsp:style>
       <dsp:txBody>
-        <a:bodyPr spcFirstLastPara="0" vert="horz" wrap="square" lIns="73660" tIns="73660" rIns="73660" bIns="73660" numCol="1" spcCol="1270" anchor="ctr" anchorCtr="0">
+        <a:bodyPr spcFirstLastPara="0" vert="horz" wrap="square" lIns="76200" tIns="76200" rIns="76200" bIns="76200" numCol="1" spcCol="1270" anchor="ctr" anchorCtr="0">
           <a:noAutofit/>
         </a:bodyPr>
         <a:lstStyle/>
         <a:p>
-          <a:pPr lvl="0" algn="ctr" defTabSz="1289050">
+          <a:pPr lvl="0" algn="ctr" defTabSz="1333500">
             <a:lnSpc>
               <a:spcPct val="90000"/>
             </a:lnSpc>
@@ -4711,10 +4722,10 @@
             </a:spcAft>
           </a:pPr>
           <a:r>
-            <a:rPr lang="en-US" sz="2900" kern="1200" dirty="0" smtClean="0"/>
+            <a:rPr lang="en-US" sz="3000" kern="1200" dirty="0" smtClean="0"/>
             <a:t>Step 2</a:t>
           </a:r>
-          <a:endParaRPr lang="en-US" sz="2900" kern="1200" dirty="0"/>
+          <a:endParaRPr lang="en-US" sz="3000" kern="1200" dirty="0"/>
         </a:p>
       </dsp:txBody>
       <dsp:txXfrm>
@@ -4936,12 +4947,12 @@
         </a:fontRef>
       </dsp:style>
       <dsp:txBody>
-        <a:bodyPr spcFirstLastPara="0" vert="horz" wrap="square" lIns="73660" tIns="73660" rIns="73660" bIns="73660" numCol="1" spcCol="1270" anchor="ctr" anchorCtr="0">
+        <a:bodyPr spcFirstLastPara="0" vert="horz" wrap="square" lIns="76200" tIns="76200" rIns="76200" bIns="76200" numCol="1" spcCol="1270" anchor="ctr" anchorCtr="0">
           <a:noAutofit/>
         </a:bodyPr>
         <a:lstStyle/>
         <a:p>
-          <a:pPr lvl="0" algn="ctr" defTabSz="1289050">
+          <a:pPr lvl="0" algn="ctr" defTabSz="1333500">
             <a:lnSpc>
               <a:spcPct val="90000"/>
             </a:lnSpc>
@@ -4953,10 +4964,10 @@
             </a:spcAft>
           </a:pPr>
           <a:r>
-            <a:rPr lang="en-US" sz="2900" kern="1200" dirty="0" smtClean="0"/>
+            <a:rPr lang="en-US" sz="3000" kern="1200" dirty="0" smtClean="0"/>
             <a:t>Step 3</a:t>
           </a:r>
-          <a:endParaRPr lang="en-US" sz="2900" kern="1200" dirty="0"/>
+          <a:endParaRPr lang="en-US" sz="3000" kern="1200" dirty="0"/>
         </a:p>
       </dsp:txBody>
       <dsp:txXfrm>
@@ -5178,12 +5189,12 @@
         </a:fontRef>
       </dsp:style>
       <dsp:txBody>
-        <a:bodyPr spcFirstLastPara="0" vert="horz" wrap="square" lIns="73660" tIns="73660" rIns="73660" bIns="73660" numCol="1" spcCol="1270" anchor="ctr" anchorCtr="0">
+        <a:bodyPr spcFirstLastPara="0" vert="horz" wrap="square" lIns="76200" tIns="76200" rIns="76200" bIns="76200" numCol="1" spcCol="1270" anchor="ctr" anchorCtr="0">
           <a:noAutofit/>
         </a:bodyPr>
         <a:lstStyle/>
         <a:p>
-          <a:pPr lvl="0" algn="ctr" defTabSz="1289050">
+          <a:pPr lvl="0" algn="ctr" defTabSz="1333500">
             <a:lnSpc>
               <a:spcPct val="90000"/>
             </a:lnSpc>
@@ -5195,10 +5206,10 @@
             </a:spcAft>
           </a:pPr>
           <a:r>
-            <a:rPr lang="en-US" sz="2900" kern="1200" dirty="0" smtClean="0"/>
+            <a:rPr lang="en-US" sz="3000" kern="1200" dirty="0" smtClean="0"/>
             <a:t>Step 4</a:t>
           </a:r>
-          <a:endParaRPr lang="en-US" sz="2900" kern="1200" dirty="0"/>
+          <a:endParaRPr lang="en-US" sz="3000" kern="1200" dirty="0"/>
         </a:p>
       </dsp:txBody>
       <dsp:txXfrm>
@@ -7867,7 +7878,7 @@
           <a:p>
             <a:fld id="{F1C0B079-A316-4C9B-B165-DF9EA8325D2C}" type="datetimeFigureOut">
               <a:rPr lang="en-US" smtClean="0"/>
-              <a:t>25/07/19</a:t>
+              <a:t>12/10/2019</a:t>
             </a:fld>
             <a:endParaRPr lang="en-US"/>
           </a:p>
@@ -8032,7 +8043,7 @@
           <a:p>
             <a:fld id="{38F28AB8-57D1-494F-9851-055AD867E790}" type="datetimeFigureOut">
               <a:rPr lang="en-US" smtClean="0"/>
-              <a:t>25/07/19</a:t>
+              <a:t>12/10/2019</a:t>
             </a:fld>
             <a:endParaRPr lang="en-US"/>
           </a:p>
@@ -11359,7 +11370,7 @@
           <a:p>
             <a:fld id="{ECAA57DF-1C19-4726-AB84-014692BAD8F5}" type="datetimeFigureOut">
               <a:rPr lang="en-US" smtClean="0"/>
-              <a:t>25/07/19</a:t>
+              <a:t>12/10/2019</a:t>
             </a:fld>
             <a:endParaRPr lang="en-US"/>
           </a:p>
@@ -11482,7 +11493,7 @@
   </p:clrMapOvr>
   <p:extLst mod="1">
     <p:ext uri="{DCECCB84-F9BA-43D5-87BE-67443E8EF086}">
-      <p15:sldGuideLst xmlns:p15="http://schemas.microsoft.com/office/powerpoint/2012/main" xmlns="">
+      <p15:sldGuideLst xmlns:p15="http://schemas.microsoft.com/office/powerpoint/2012/main">
         <p15:guide id="1" pos="9168" userDrawn="1">
           <p15:clr>
             <a:srgbClr val="A4A3A4"/>
@@ -11698,7 +11709,7 @@
             <a:fld id="{ECAA57DF-1C19-4726-AB84-014692BAD8F5}" type="datetimeFigureOut">
               <a:rPr lang="en-US" smtClean="0"/>
               <a:pPr/>
-              <a:t>25/07/19</a:t>
+              <a:t>12/10/2019</a:t>
             </a:fld>
             <a:endParaRPr lang="en-US"/>
           </a:p>
@@ -12203,7 +12214,7 @@
   </p:txStyles>
   <p:extLst mod="1">
     <p:ext uri="{27BBF7A9-308A-43DC-89C8-2F10F3537804}">
-      <p15:sldGuideLst xmlns:p15="http://schemas.microsoft.com/office/powerpoint/2012/main" xmlns="">
+      <p15:sldGuideLst xmlns:p15="http://schemas.microsoft.com/office/powerpoint/2012/main">
         <p15:guide id="1" orient="horz" pos="10368" userDrawn="1">
           <p15:clr>
             <a:srgbClr val="A4A3A4"/>
@@ -12264,11 +12275,7 @@
           <a:p>
             <a:r>
               <a:rPr lang="en-US" dirty="0" smtClean="0"/>
-              <a:t>Project </a:t>
-            </a:r>
-            <a:r>
-              <a:rPr lang="en-US" dirty="0" smtClean="0"/>
-              <a:t>Title</a:t>
+              <a:t>IOT-BASED GREENHOUSE AUTOMATION</a:t>
             </a:r>
             <a:endParaRPr lang="en-US" dirty="0"/>
           </a:p>
@@ -12291,11 +12298,7 @@
           <a:p>
             <a:r>
               <a:rPr lang="en-US" dirty="0" smtClean="0"/>
-              <a:t>Your name | </a:t>
-            </a:r>
-            <a:r>
-              <a:rPr lang="en-US" dirty="0" smtClean="0"/>
-              <a:t>Your Name| Your name </a:t>
+              <a:t> | Your Name| Your name </a:t>
             </a:r>
             <a:endParaRPr lang="en-US" dirty="0"/>
           </a:p>
@@ -12341,7 +12344,7 @@
           <a:p>
             <a:r>
               <a:rPr lang="en-US" dirty="0" smtClean="0"/>
-              <a:t>Problem being addressed by the project. Include who is affected and how</a:t>
+              <a:t>Insufficient food production due to increasing population and urbanization.</a:t>
             </a:r>
             <a:endParaRPr lang="en-US" dirty="0"/>
           </a:p>
@@ -12382,24 +12385,79 @@
         </p:nvSpPr>
         <p:spPr/>
         <p:txBody>
-          <a:bodyPr/>
+          <a:bodyPr>
+            <a:normAutofit fontScale="40000" lnSpcReduction="20000"/>
+          </a:bodyPr>
           <a:lstStyle/>
           <a:p>
-            <a:endParaRPr lang="en-US" dirty="0" smtClean="0"/>
-          </a:p>
-          <a:p>
+            <a:pPr marL="0" indent="0">
+              <a:buNone/>
+            </a:pPr>
+            <a:r>
+              <a:rPr lang="en-US" b="1" dirty="0" smtClean="0"/>
+              <a:t>Main Objective</a:t>
+            </a:r>
+          </a:p>
+          <a:p>
+            <a:pPr marL="0" indent="0">
+              <a:buNone/>
+            </a:pPr>
             <a:r>
               <a:rPr lang="en-US" dirty="0" smtClean="0"/>
-              <a:t>State the </a:t>
+              <a:t>To increase food production with minimal labor through automation</a:t>
             </a:r>
+          </a:p>
+          <a:p>
+            <a:pPr marL="0" indent="0">
+              <a:buNone/>
+            </a:pPr>
+            <a:endParaRPr lang="en-US" dirty="0" smtClean="0"/>
+          </a:p>
+          <a:p>
+            <a:pPr marL="0" indent="0">
+              <a:buNone/>
+            </a:pPr>
             <a:r>
-              <a:rPr lang="en-US" dirty="0" err="1" smtClean="0"/>
-              <a:t>projectives</a:t>
+              <a:rPr lang="en-US" b="1" dirty="0" smtClean="0"/>
+              <a:t>Specific Objectives</a:t>
+            </a:r>
+            <a:endParaRPr lang="en-US" b="1" dirty="0" smtClean="0"/>
+          </a:p>
+          <a:p>
+            <a:r>
+              <a:rPr lang="en-US" dirty="0" smtClean="0"/>
+              <a:t>To </a:t>
             </a:r>
             <a:r>
               <a:rPr lang="en-US" dirty="0" smtClean="0"/>
-              <a:t> </a:t>
+              <a:t>study and analyze the current greenhouse systems.</a:t>
             </a:r>
+          </a:p>
+          <a:p>
+            <a:r>
+              <a:rPr lang="en-US" dirty="0" smtClean="0"/>
+              <a:t>To design a miniature greenhouse, which is equipped with an automatic monitoring and controlling system.</a:t>
+            </a:r>
+          </a:p>
+          <a:p>
+            <a:r>
+              <a:rPr lang="en-US" dirty="0" smtClean="0"/>
+              <a:t>To implement and test the system.</a:t>
+            </a:r>
+          </a:p>
+          <a:p>
+            <a:r>
+              <a:rPr lang="en-US" dirty="0" smtClean="0"/>
+              <a:t>To constantly monitor and control the environmental conditions in the greenhouse to ensure it remains at preset temperature, light, moisture and humidity levels.</a:t>
+            </a:r>
+          </a:p>
+          <a:p>
+            <a:endParaRPr lang="en-US" dirty="0" smtClean="0"/>
+          </a:p>
+          <a:p>
+            <a:pPr marL="0" indent="0">
+              <a:buNone/>
+            </a:pPr>
             <a:endParaRPr lang="en-US" dirty="0"/>
           </a:p>
         </p:txBody>
@@ -12421,11 +12479,7 @@
           <a:p>
             <a:r>
               <a:rPr lang="en-US" dirty="0" smtClean="0"/>
-              <a:t>Project </a:t>
-            </a:r>
-            <a:r>
-              <a:rPr lang="en-US" dirty="0" smtClean="0"/>
-              <a:t>Requirements</a:t>
+              <a:t>Project Requirements</a:t>
             </a:r>
             <a:endParaRPr lang="en-US" dirty="0"/>
           </a:p>
@@ -12879,7 +12933,7 @@
   <p:timing>
     <p:tnLst>
       <p:par>
-        <p:cTn xmlns:p14="http://schemas.microsoft.com/office/powerpoint/2010/main" id="1" dur="indefinite" restart="never" nodeType="tmRoot"/>
+        <p:cTn id="1" dur="indefinite" restart="never" nodeType="tmRoot"/>
       </p:par>
     </p:tnLst>
   </p:timing>
@@ -13212,7 +13266,7 @@
   <a:extraClrSchemeLst/>
   <a:extLst>
     <a:ext uri="{05A4C25C-085E-4340-85A3-A5531E510DB2}">
-      <thm15:themeFamily xmlns:thm15="http://schemas.microsoft.com/office/thememl/2012/main" xmlns="" name="Presentation2" id="{A3AC1795-03CA-4218-8E9C-394F2C72EB71}" vid="{9E91E023-53D0-48CE-AFD1-CE3DA49243D0}"/>
+      <thm15:themeFamily xmlns:thm15="http://schemas.microsoft.com/office/thememl/2012/main" name="Presentation2" id="{A3AC1795-03CA-4218-8E9C-394F2C72EB71}" vid="{9E91E023-53D0-48CE-AFD1-CE3DA49243D0}"/>
     </a:ext>
   </a:extLst>
 </a:theme>
@@ -13473,7 +13527,7 @@
   <a:extraClrSchemeLst/>
   <a:extLst>
     <a:ext uri="{05A4C25C-085E-4340-85A3-A5531E510DB2}">
-      <thm15:themeFamily xmlns:thm15="http://schemas.microsoft.com/office/thememl/2012/main" xmlns="" name="Office Theme" id="{62F939B6-93AF-4DB8-9C6B-D6C7DFDC589F}" vid="{4A3C46E8-61CC-4603-A589-7422A47A8E4A}"/>
+      <thm15:themeFamily xmlns:thm15="http://schemas.microsoft.com/office/thememl/2012/main" name="Office Theme" id="{62F939B6-93AF-4DB8-9C6B-D6C7DFDC589F}" vid="{4A3C46E8-61CC-4603-A589-7422A47A8E4A}"/>
     </a:ext>
   </a:extLst>
 </a:theme>
@@ -13734,7 +13788,7 @@
   <a:extraClrSchemeLst/>
   <a:extLst>
     <a:ext uri="{05A4C25C-085E-4340-85A3-A5531E510DB2}">
-      <thm15:themeFamily xmlns:thm15="http://schemas.microsoft.com/office/thememl/2012/main" xmlns="" name="Office Theme" id="{62F939B6-93AF-4DB8-9C6B-D6C7DFDC589F}" vid="{4A3C46E8-61CC-4603-A589-7422A47A8E4A}"/>
+      <thm15:themeFamily xmlns:thm15="http://schemas.microsoft.com/office/thememl/2012/main" name="Office Theme" id="{62F939B6-93AF-4DB8-9C6B-D6C7DFDC589F}" vid="{4A3C46E8-61CC-4603-A589-7422A47A8E4A}"/>
     </a:ext>
   </a:extLst>
 </a:theme>

</xml_diff>

<commit_message>
i have added our names, project requirements
</commit_message>
<xml_diff>
--- a/poster.pptx
+++ b/poster.pptx
@@ -133,7 +133,7 @@
 </file>
 
 <file path=ppt/charts/chart1.xml><?xml version="1.0" encoding="utf-8"?>
-<c:chartSpace xmlns:c="http://schemas.openxmlformats.org/drawingml/2006/chart" xmlns:a="http://schemas.openxmlformats.org/drawingml/2006/main" xmlns:r="http://schemas.openxmlformats.org/officeDocument/2006/relationships">
+<c:chartSpace xmlns:c="http://schemas.openxmlformats.org/drawingml/2006/chart" xmlns:a="http://schemas.openxmlformats.org/drawingml/2006/main" xmlns:r="http://schemas.openxmlformats.org/officeDocument/2006/relationships" xmlns:c16r2="http://schemas.microsoft.com/office/drawing/2015/06/chart">
   <c:date1904 val="0"/>
   <c:lang val="en-US"/>
   <c:roundedCorners val="0"/>
@@ -147,7 +147,6 @@
   </mc:AlternateContent>
   <c:chart>
     <c:title>
-      <c:layout/>
       <c:overlay val="0"/>
       <c:spPr>
         <a:noFill/>
@@ -251,6 +250,11 @@
               </c:numCache>
             </c:numRef>
           </c:val>
+          <c:extLst>
+            <c:ext xmlns:c16="http://schemas.microsoft.com/office/drawing/2014/chart" uri="{C3380CC4-5D6E-409C-BE32-E72D297353CC}">
+              <c16:uniqueId val="{00000000-6146-487D-B51A-ED6A99B1144A}"/>
+            </c:ext>
+          </c:extLst>
         </c:ser>
         <c:ser>
           <c:idx val="1"/>
@@ -319,6 +323,11 @@
               </c:numCache>
             </c:numRef>
           </c:val>
+          <c:extLst>
+            <c:ext xmlns:c16="http://schemas.microsoft.com/office/drawing/2014/chart" uri="{C3380CC4-5D6E-409C-BE32-E72D297353CC}">
+              <c16:uniqueId val="{00000001-6146-487D-B51A-ED6A99B1144A}"/>
+            </c:ext>
+          </c:extLst>
         </c:ser>
         <c:ser>
           <c:idx val="2"/>
@@ -387,6 +396,11 @@
               </c:numCache>
             </c:numRef>
           </c:val>
+          <c:extLst>
+            <c:ext xmlns:c16="http://schemas.microsoft.com/office/drawing/2014/chart" uri="{C3380CC4-5D6E-409C-BE32-E72D297353CC}">
+              <c16:uniqueId val="{00000002-6146-487D-B51A-ED6A99B1144A}"/>
+            </c:ext>
+          </c:extLst>
         </c:ser>
         <c:dLbls>
           <c:showLegendKey val="0"/>
@@ -518,7 +532,6 @@
     </c:plotArea>
     <c:legend>
       <c:legendPos val="b"/>
-      <c:layout/>
       <c:overlay val="0"/>
       <c:spPr>
         <a:noFill/>
@@ -2623,10 +2636,9 @@
         <a:lstStyle/>
         <a:p>
           <a:r>
-            <a:rPr lang="en-US" sz="2800" dirty="0" smtClean="0"/>
-            <a:t>User category 1</a:t>
+            <a:rPr lang="en-US" sz="2800" dirty="0"/>
+            <a:t>User category xx</a:t>
           </a:r>
-          <a:endParaRPr lang="en-US" sz="2800" dirty="0"/>
         </a:p>
       </dgm:t>
     </dgm:pt>
@@ -2660,10 +2672,9 @@
         <a:lstStyle/>
         <a:p>
           <a:r>
-            <a:rPr lang="en-US" sz="2800" dirty="0" smtClean="0"/>
+            <a:rPr lang="en-US" sz="2800" dirty="0"/>
             <a:t>State what they will use the  system for</a:t>
           </a:r>
-          <a:endParaRPr lang="en-US" sz="2800" dirty="0"/>
         </a:p>
       </dgm:t>
     </dgm:pt>
@@ -2697,18 +2708,9 @@
         <a:lstStyle/>
         <a:p>
           <a:r>
-            <a:rPr lang="en-US" sz="2800" dirty="0" smtClean="0"/>
-            <a:t>User </a:t>
+            <a:rPr lang="en-US" sz="2800" dirty="0"/>
+            <a:t>User category xx</a:t>
           </a:r>
-          <a:r>
-            <a:rPr lang="en-US" sz="2800" dirty="0" err="1" smtClean="0"/>
-            <a:t>cateory</a:t>
-          </a:r>
-          <a:r>
-            <a:rPr lang="en-US" sz="2800" dirty="0" smtClean="0"/>
-            <a:t> 2</a:t>
-          </a:r>
-          <a:endParaRPr lang="en-US" sz="2800" dirty="0"/>
         </a:p>
       </dgm:t>
     </dgm:pt>
@@ -2742,10 +2744,9 @@
         <a:lstStyle/>
         <a:p>
           <a:r>
-            <a:rPr lang="en-US" sz="2800" dirty="0" smtClean="0"/>
+            <a:rPr lang="en-US" sz="2800" dirty="0"/>
             <a:t>State what they will use the  system for</a:t>
           </a:r>
-          <a:endParaRPr lang="en-US" sz="2800" dirty="0"/>
         </a:p>
       </dgm:t>
     </dgm:pt>
@@ -2779,18 +2780,9 @@
         <a:lstStyle/>
         <a:p>
           <a:r>
-            <a:rPr lang="en-US" sz="2800" dirty="0" smtClean="0"/>
-            <a:t>User </a:t>
+            <a:rPr lang="en-US" sz="2800" dirty="0"/>
+            <a:t>User category xx</a:t>
           </a:r>
-          <a:r>
-            <a:rPr lang="en-US" sz="2800" dirty="0" err="1" smtClean="0"/>
-            <a:t>categor</a:t>
-          </a:r>
-          <a:r>
-            <a:rPr lang="en-US" sz="2800" dirty="0" smtClean="0"/>
-            <a:t> xx</a:t>
-          </a:r>
-          <a:endParaRPr lang="en-US" sz="2800" dirty="0"/>
         </a:p>
       </dgm:t>
     </dgm:pt>
@@ -2824,10 +2816,9 @@
         <a:lstStyle/>
         <a:p>
           <a:r>
-            <a:rPr lang="en-US" sz="2800" dirty="0" smtClean="0"/>
+            <a:rPr lang="en-US" sz="2800" dirty="0"/>
             <a:t>State what they will use the  system for</a:t>
           </a:r>
-          <a:endParaRPr lang="en-US" sz="2800" dirty="0"/>
         </a:p>
       </dgm:t>
     </dgm:pt>
@@ -2862,13 +2853,6 @@
         </dgm:presLayoutVars>
       </dgm:prSet>
       <dgm:spPr/>
-      <dgm:t>
-        <a:bodyPr/>
-        <a:lstStyle/>
-        <a:p>
-          <a:endParaRPr lang="en-US"/>
-        </a:p>
-      </dgm:t>
     </dgm:pt>
     <dgm:pt modelId="{70E9962D-05C5-4F85-A473-03B50B9C6416}" type="pres">
       <dgm:prSet presAssocID="{06F1FE2A-97BA-4B52-B3A6-E44D1F20CB28}" presName="composite" presStyleCnt="0"/>
@@ -2883,13 +2867,6 @@
         </dgm:presLayoutVars>
       </dgm:prSet>
       <dgm:spPr/>
-      <dgm:t>
-        <a:bodyPr/>
-        <a:lstStyle/>
-        <a:p>
-          <a:endParaRPr lang="en-US"/>
-        </a:p>
-      </dgm:t>
     </dgm:pt>
     <dgm:pt modelId="{DE65B54D-BB89-4898-B770-68834B90CB27}" type="pres">
       <dgm:prSet presAssocID="{06F1FE2A-97BA-4B52-B3A6-E44D1F20CB28}" presName="desTx" presStyleLbl="alignAccFollowNode1" presStyleIdx="0" presStyleCnt="3">
@@ -2898,13 +2875,6 @@
         </dgm:presLayoutVars>
       </dgm:prSet>
       <dgm:spPr/>
-      <dgm:t>
-        <a:bodyPr/>
-        <a:lstStyle/>
-        <a:p>
-          <a:endParaRPr lang="en-US"/>
-        </a:p>
-      </dgm:t>
     </dgm:pt>
     <dgm:pt modelId="{A7E2C66E-7169-4E42-A713-6528CC71DD9D}" type="pres">
       <dgm:prSet presAssocID="{0CACD921-34CA-4681-87F1-041A98C27B3D}" presName="space" presStyleCnt="0"/>
@@ -2923,13 +2893,6 @@
         </dgm:presLayoutVars>
       </dgm:prSet>
       <dgm:spPr/>
-      <dgm:t>
-        <a:bodyPr/>
-        <a:lstStyle/>
-        <a:p>
-          <a:endParaRPr lang="en-US"/>
-        </a:p>
-      </dgm:t>
     </dgm:pt>
     <dgm:pt modelId="{6EC96761-7A7E-46B1-9A31-B92F49834D5A}" type="pres">
       <dgm:prSet presAssocID="{184B56DA-A66C-4DD0-AE11-0A7EBA387E48}" presName="desTx" presStyleLbl="alignAccFollowNode1" presStyleIdx="1" presStyleCnt="3">
@@ -2938,13 +2901,6 @@
         </dgm:presLayoutVars>
       </dgm:prSet>
       <dgm:spPr/>
-      <dgm:t>
-        <a:bodyPr/>
-        <a:lstStyle/>
-        <a:p>
-          <a:endParaRPr lang="en-US"/>
-        </a:p>
-      </dgm:t>
     </dgm:pt>
     <dgm:pt modelId="{D004D87C-D390-4BAA-B20D-69AF97599BD7}" type="pres">
       <dgm:prSet presAssocID="{8EE144C8-20EA-43DA-B048-41CEE06807BC}" presName="space" presStyleCnt="0"/>
@@ -2963,13 +2919,6 @@
         </dgm:presLayoutVars>
       </dgm:prSet>
       <dgm:spPr/>
-      <dgm:t>
-        <a:bodyPr/>
-        <a:lstStyle/>
-        <a:p>
-          <a:endParaRPr lang="en-US"/>
-        </a:p>
-      </dgm:t>
     </dgm:pt>
     <dgm:pt modelId="{98860936-C475-4184-9A9D-2F4B5D8B0BC7}" type="pres">
       <dgm:prSet presAssocID="{2F8ECEAC-FAA3-4503-A169-57F41A503807}" presName="desTx" presStyleLbl="alignAccFollowNode1" presStyleIdx="2" presStyleCnt="3">
@@ -2978,29 +2927,22 @@
         </dgm:presLayoutVars>
       </dgm:prSet>
       <dgm:spPr/>
-      <dgm:t>
-        <a:bodyPr/>
-        <a:lstStyle/>
-        <a:p>
-          <a:endParaRPr lang="en-US"/>
-        </a:p>
-      </dgm:t>
     </dgm:pt>
   </dgm:ptLst>
   <dgm:cxnLst>
-    <dgm:cxn modelId="{9C3D3653-8462-4AAD-A961-3717216B9CF2}" type="presOf" srcId="{06F1FE2A-97BA-4B52-B3A6-E44D1F20CB28}" destId="{B8C15370-9E21-4343-A577-4985C41A0B6E}" srcOrd="0" destOrd="0" presId="urn:microsoft.com/office/officeart/2005/8/layout/hList1"/>
-    <dgm:cxn modelId="{4E402F4F-22AD-4214-BE8C-948F617ABB38}" type="presOf" srcId="{BB5A00DF-7368-4451-822A-C5213BEFEEBE}" destId="{98860936-C475-4184-9A9D-2F4B5D8B0BC7}" srcOrd="0" destOrd="0" presId="urn:microsoft.com/office/officeart/2005/8/layout/hList1"/>
-    <dgm:cxn modelId="{31D0EEFF-9776-4597-8873-3B56F9091C86}" srcId="{184B56DA-A66C-4DD0-AE11-0A7EBA387E48}" destId="{17AF0C1B-AB46-4643-AAAB-C00D253E5731}" srcOrd="0" destOrd="0" parTransId="{29C3C336-A8CD-48B5-9F85-325299B52A84}" sibTransId="{631D11DF-11B6-487B-8148-E2BF1F9190AD}"/>
-    <dgm:cxn modelId="{ACB965C6-1ACF-483C-9C29-8A17C949C706}" srcId="{06F1FE2A-97BA-4B52-B3A6-E44D1F20CB28}" destId="{4640F6E6-EF32-4372-9B3B-2FFD48F9CB5C}" srcOrd="0" destOrd="0" parTransId="{DB4F8E23-BBE6-4AB5-9D82-74F5115D7455}" sibTransId="{55E32D54-3DF3-4F3F-B3B8-1AEE5606EC62}"/>
-    <dgm:cxn modelId="{51EFA3EF-F9E3-4B84-BA84-84A3BBF4D4D3}" type="presOf" srcId="{17AF0C1B-AB46-4643-AAAB-C00D253E5731}" destId="{6EC96761-7A7E-46B1-9A31-B92F49834D5A}" srcOrd="0" destOrd="0" presId="urn:microsoft.com/office/officeart/2005/8/layout/hList1"/>
     <dgm:cxn modelId="{3F455948-84CC-4BD3-B122-BC7FC520F6C2}" srcId="{2F8ECEAC-FAA3-4503-A169-57F41A503807}" destId="{BB5A00DF-7368-4451-822A-C5213BEFEEBE}" srcOrd="0" destOrd="0" parTransId="{DBF05790-03E0-47D4-8137-1ED35487613F}" sibTransId="{1FC1A5B2-F57F-4D1D-AD7C-59801453B2A1}"/>
     <dgm:cxn modelId="{9BA84549-343A-497A-8F50-EA4C874AF4DD}" type="presOf" srcId="{2F8ECEAC-FAA3-4503-A169-57F41A503807}" destId="{64DD6D48-227C-4434-BED8-F49C9D4F4F7E}" srcOrd="0" destOrd="0" presId="urn:microsoft.com/office/officeart/2005/8/layout/hList1"/>
+    <dgm:cxn modelId="{4E402F4F-22AD-4214-BE8C-948F617ABB38}" type="presOf" srcId="{BB5A00DF-7368-4451-822A-C5213BEFEEBE}" destId="{98860936-C475-4184-9A9D-2F4B5D8B0BC7}" srcOrd="0" destOrd="0" presId="urn:microsoft.com/office/officeart/2005/8/layout/hList1"/>
+    <dgm:cxn modelId="{9C3D3653-8462-4AAD-A961-3717216B9CF2}" type="presOf" srcId="{06F1FE2A-97BA-4B52-B3A6-E44D1F20CB28}" destId="{B8C15370-9E21-4343-A577-4985C41A0B6E}" srcOrd="0" destOrd="0" presId="urn:microsoft.com/office/officeart/2005/8/layout/hList1"/>
+    <dgm:cxn modelId="{24836079-9FDA-4F84-9291-518671EE6E30}" srcId="{425AB2E9-3568-4939-AD20-F42726F09D02}" destId="{2F8ECEAC-FAA3-4503-A169-57F41A503807}" srcOrd="2" destOrd="0" parTransId="{ACAA3BC8-2CDA-42A5-8DD6-5A948ACC6FCF}" sibTransId="{61A568BF-D1AB-4345-9CA7-878468CAA9E0}"/>
+    <dgm:cxn modelId="{01AD485A-0916-4A80-9CBA-29870F4D202A}" srcId="{425AB2E9-3568-4939-AD20-F42726F09D02}" destId="{184B56DA-A66C-4DD0-AE11-0A7EBA387E48}" srcOrd="1" destOrd="0" parTransId="{3C1C544F-4C0C-4E19-A3D2-C3E5175D7B4B}" sibTransId="{8EE144C8-20EA-43DA-B048-41CEE06807BC}"/>
+    <dgm:cxn modelId="{FC6EE199-23CF-4307-94F8-FC53916EA51A}" srcId="{425AB2E9-3568-4939-AD20-F42726F09D02}" destId="{06F1FE2A-97BA-4B52-B3A6-E44D1F20CB28}" srcOrd="0" destOrd="0" parTransId="{272155B6-483B-4675-B173-D3F00A201046}" sibTransId="{0CACD921-34CA-4681-87F1-041A98C27B3D}"/>
     <dgm:cxn modelId="{913323B4-1F88-4AC5-8C9E-BE0572C8023B}" type="presOf" srcId="{4640F6E6-EF32-4372-9B3B-2FFD48F9CB5C}" destId="{DE65B54D-BB89-4898-B770-68834B90CB27}" srcOrd="0" destOrd="0" presId="urn:microsoft.com/office/officeart/2005/8/layout/hList1"/>
-    <dgm:cxn modelId="{FC6EE199-23CF-4307-94F8-FC53916EA51A}" srcId="{425AB2E9-3568-4939-AD20-F42726F09D02}" destId="{06F1FE2A-97BA-4B52-B3A6-E44D1F20CB28}" srcOrd="0" destOrd="0" parTransId="{272155B6-483B-4675-B173-D3F00A201046}" sibTransId="{0CACD921-34CA-4681-87F1-041A98C27B3D}"/>
+    <dgm:cxn modelId="{ACB965C6-1ACF-483C-9C29-8A17C949C706}" srcId="{06F1FE2A-97BA-4B52-B3A6-E44D1F20CB28}" destId="{4640F6E6-EF32-4372-9B3B-2FFD48F9CB5C}" srcOrd="0" destOrd="0" parTransId="{DB4F8E23-BBE6-4AB5-9D82-74F5115D7455}" sibTransId="{55E32D54-3DF3-4F3F-B3B8-1AEE5606EC62}"/>
+    <dgm:cxn modelId="{12E1A9E1-0E2B-4599-8D03-2A69A1547115}" type="presOf" srcId="{425AB2E9-3568-4939-AD20-F42726F09D02}" destId="{4351CFC8-37EC-494B-A841-287649776134}" srcOrd="0" destOrd="0" presId="urn:microsoft.com/office/officeart/2005/8/layout/hList1"/>
+    <dgm:cxn modelId="{51EFA3EF-F9E3-4B84-BA84-84A3BBF4D4D3}" type="presOf" srcId="{17AF0C1B-AB46-4643-AAAB-C00D253E5731}" destId="{6EC96761-7A7E-46B1-9A31-B92F49834D5A}" srcOrd="0" destOrd="0" presId="urn:microsoft.com/office/officeart/2005/8/layout/hList1"/>
     <dgm:cxn modelId="{7FD88FF9-53A7-4C08-9686-37472D3C5F90}" type="presOf" srcId="{184B56DA-A66C-4DD0-AE11-0A7EBA387E48}" destId="{E01B3154-0666-4584-9FC4-432DE00CC402}" srcOrd="0" destOrd="0" presId="urn:microsoft.com/office/officeart/2005/8/layout/hList1"/>
-    <dgm:cxn modelId="{01AD485A-0916-4A80-9CBA-29870F4D202A}" srcId="{425AB2E9-3568-4939-AD20-F42726F09D02}" destId="{184B56DA-A66C-4DD0-AE11-0A7EBA387E48}" srcOrd="1" destOrd="0" parTransId="{3C1C544F-4C0C-4E19-A3D2-C3E5175D7B4B}" sibTransId="{8EE144C8-20EA-43DA-B048-41CEE06807BC}"/>
-    <dgm:cxn modelId="{24836079-9FDA-4F84-9291-518671EE6E30}" srcId="{425AB2E9-3568-4939-AD20-F42726F09D02}" destId="{2F8ECEAC-FAA3-4503-A169-57F41A503807}" srcOrd="2" destOrd="0" parTransId="{ACAA3BC8-2CDA-42A5-8DD6-5A948ACC6FCF}" sibTransId="{61A568BF-D1AB-4345-9CA7-878468CAA9E0}"/>
-    <dgm:cxn modelId="{12E1A9E1-0E2B-4599-8D03-2A69A1547115}" type="presOf" srcId="{425AB2E9-3568-4939-AD20-F42726F09D02}" destId="{4351CFC8-37EC-494B-A841-287649776134}" srcOrd="0" destOrd="0" presId="urn:microsoft.com/office/officeart/2005/8/layout/hList1"/>
+    <dgm:cxn modelId="{31D0EEFF-9776-4597-8873-3B56F9091C86}" srcId="{184B56DA-A66C-4DD0-AE11-0A7EBA387E48}" destId="{17AF0C1B-AB46-4643-AAAB-C00D253E5731}" srcOrd="0" destOrd="0" parTransId="{29C3C336-A8CD-48B5-9F85-325299B52A84}" sibTransId="{631D11DF-11B6-487B-8148-E2BF1F9190AD}"/>
     <dgm:cxn modelId="{AE41C4D7-1708-49AF-AE4A-683C8CF513D4}" type="presParOf" srcId="{4351CFC8-37EC-494B-A841-287649776134}" destId="{70E9962D-05C5-4F85-A473-03B50B9C6416}" srcOrd="0" destOrd="0" presId="urn:microsoft.com/office/officeart/2005/8/layout/hList1"/>
     <dgm:cxn modelId="{54821AC3-B761-4DE3-A299-35C839B48BE7}" type="presParOf" srcId="{70E9962D-05C5-4F85-A473-03B50B9C6416}" destId="{B8C15370-9E21-4343-A577-4985C41A0B6E}" srcOrd="0" destOrd="0" presId="urn:microsoft.com/office/officeart/2005/8/layout/hList1"/>
     <dgm:cxn modelId="{3935A46C-E062-4151-BCBD-56617280633D}" type="presParOf" srcId="{70E9962D-05C5-4F85-A473-03B50B9C6416}" destId="{DE65B54D-BB89-4898-B770-68834B90CB27}" srcOrd="1" destOrd="0" presId="urn:microsoft.com/office/officeart/2005/8/layout/hList1"/>
@@ -3045,10 +2987,9 @@
         <a:lstStyle/>
         <a:p>
           <a:r>
-            <a:rPr lang="en-US" dirty="0" smtClean="0"/>
+            <a:rPr lang="en-US" dirty="0"/>
             <a:t>Step 1</a:t>
           </a:r>
-          <a:endParaRPr lang="en-US" dirty="0"/>
         </a:p>
       </dgm:t>
     </dgm:pt>
@@ -3082,10 +3023,9 @@
         <a:lstStyle/>
         <a:p>
           <a:r>
-            <a:rPr lang="en-US" dirty="0" smtClean="0"/>
+            <a:rPr lang="en-US" dirty="0"/>
             <a:t>Show key components of your system</a:t>
           </a:r>
-          <a:endParaRPr lang="en-US" dirty="0"/>
         </a:p>
       </dgm:t>
     </dgm:pt>
@@ -3119,10 +3059,9 @@
         <a:lstStyle/>
         <a:p>
           <a:r>
-            <a:rPr lang="en-US" dirty="0" smtClean="0"/>
+            <a:rPr lang="en-US" dirty="0"/>
             <a:t>Step 2</a:t>
           </a:r>
-          <a:endParaRPr lang="en-US" dirty="0"/>
         </a:p>
       </dgm:t>
     </dgm:pt>
@@ -3156,7 +3095,7 @@
         <a:lstStyle/>
         <a:p>
           <a:r>
-            <a:rPr lang="en-US" smtClean="0"/>
+            <a:rPr lang="en-US"/>
             <a:t>Describe this step in your experiment</a:t>
           </a:r>
           <a:endParaRPr lang="en-US" dirty="0"/>
@@ -3193,10 +3132,9 @@
         <a:lstStyle/>
         <a:p>
           <a:r>
-            <a:rPr lang="en-US" dirty="0" smtClean="0"/>
+            <a:rPr lang="en-US" dirty="0"/>
             <a:t>Step 3</a:t>
           </a:r>
-          <a:endParaRPr lang="en-US" dirty="0"/>
         </a:p>
       </dgm:t>
     </dgm:pt>
@@ -3230,10 +3168,9 @@
         <a:lstStyle/>
         <a:p>
           <a:r>
-            <a:rPr lang="en-US" dirty="0" smtClean="0"/>
+            <a:rPr lang="en-US" dirty="0"/>
             <a:t>Describe this step in your experiment</a:t>
           </a:r>
-          <a:endParaRPr lang="en-US" dirty="0"/>
         </a:p>
       </dgm:t>
     </dgm:pt>
@@ -3267,10 +3204,9 @@
         <a:lstStyle/>
         <a:p>
           <a:r>
-            <a:rPr lang="en-US" dirty="0" smtClean="0"/>
+            <a:rPr lang="en-US" dirty="0"/>
             <a:t>Step 4</a:t>
           </a:r>
-          <a:endParaRPr lang="en-US" dirty="0"/>
         </a:p>
       </dgm:t>
     </dgm:pt>
@@ -3304,10 +3240,9 @@
         <a:lstStyle/>
         <a:p>
           <a:r>
-            <a:rPr lang="en-US" dirty="0" smtClean="0"/>
+            <a:rPr lang="en-US" dirty="0"/>
             <a:t>Describe this step in your experiment</a:t>
           </a:r>
-          <a:endParaRPr lang="en-US" dirty="0"/>
         </a:p>
       </dgm:t>
     </dgm:pt>
@@ -3373,13 +3308,6 @@
         </dgm:presLayoutVars>
       </dgm:prSet>
       <dgm:spPr/>
-      <dgm:t>
-        <a:bodyPr/>
-        <a:lstStyle/>
-        <a:p>
-          <a:endParaRPr lang="en-US"/>
-        </a:p>
-      </dgm:t>
     </dgm:pt>
     <dgm:pt modelId="{8C8EDC2C-400F-4A87-B348-71B90CDC58F1}" type="pres">
       <dgm:prSet presAssocID="{A518A75D-9854-4CDE-9FB7-B1EBB324AAED}" presName="composite" presStyleCnt="0"/>
@@ -3406,13 +3334,6 @@
           </a:stretch>
         </a:blipFill>
       </dgm:spPr>
-      <dgm:t>
-        <a:bodyPr/>
-        <a:lstStyle/>
-        <a:p>
-          <a:endParaRPr lang="en-US"/>
-        </a:p>
-      </dgm:t>
       <dgm:extLst>
         <a:ext uri="{E40237B7-FDA0-4F09-8148-C483321AD2D9}">
           <dgm14:cNvPr xmlns:dgm14="http://schemas.microsoft.com/office/drawing/2010/diagram" id="0" name="" descr="Stack of file folders and papers with pen on top." title="Sample Picture"/>
@@ -3426,13 +3347,6 @@
         </dgm:presLayoutVars>
       </dgm:prSet>
       <dgm:spPr/>
-      <dgm:t>
-        <a:bodyPr/>
-        <a:lstStyle/>
-        <a:p>
-          <a:endParaRPr lang="en-US"/>
-        </a:p>
-      </dgm:t>
     </dgm:pt>
     <dgm:pt modelId="{770E20EC-6929-4A45-99D5-285545E37892}" type="pres">
       <dgm:prSet presAssocID="{A518A75D-9854-4CDE-9FB7-B1EBB324AAED}" presName="Parent" presStyleLbl="alignNode1" presStyleIdx="0" presStyleCnt="4">
@@ -3441,13 +3355,6 @@
         </dgm:presLayoutVars>
       </dgm:prSet>
       <dgm:spPr/>
-      <dgm:t>
-        <a:bodyPr/>
-        <a:lstStyle/>
-        <a:p>
-          <a:endParaRPr lang="en-US"/>
-        </a:p>
-      </dgm:t>
     </dgm:pt>
     <dgm:pt modelId="{F445107B-3E02-430C-9039-D2AE418B235A}" type="pres">
       <dgm:prSet presAssocID="{FF440F30-5F7D-44F0-8264-C65521A11F0C}" presName="sibTrans" presStyleCnt="0"/>
@@ -3478,13 +3385,6 @@
           </a:stretch>
         </a:blipFill>
       </dgm:spPr>
-      <dgm:t>
-        <a:bodyPr/>
-        <a:lstStyle/>
-        <a:p>
-          <a:endParaRPr lang="en-US"/>
-        </a:p>
-      </dgm:t>
       <dgm:extLst>
         <a:ext uri="{E40237B7-FDA0-4F09-8148-C483321AD2D9}">
           <dgm14:cNvPr xmlns:dgm14="http://schemas.microsoft.com/office/drawing/2010/diagram" id="0" name="" descr="Four people having a discussion in office with large windows." title="Sample Picture"/>
@@ -3498,13 +3398,6 @@
         </dgm:presLayoutVars>
       </dgm:prSet>
       <dgm:spPr/>
-      <dgm:t>
-        <a:bodyPr/>
-        <a:lstStyle/>
-        <a:p>
-          <a:endParaRPr lang="en-US"/>
-        </a:p>
-      </dgm:t>
     </dgm:pt>
     <dgm:pt modelId="{16EEE8E2-3D18-44F6-B04A-3D59841E4FA8}" type="pres">
       <dgm:prSet presAssocID="{25AF84C7-6ED7-450C-83EA-4337CE735A70}" presName="Parent" presStyleLbl="alignNode1" presStyleIdx="1" presStyleCnt="4">
@@ -3513,13 +3406,6 @@
         </dgm:presLayoutVars>
       </dgm:prSet>
       <dgm:spPr/>
-      <dgm:t>
-        <a:bodyPr/>
-        <a:lstStyle/>
-        <a:p>
-          <a:endParaRPr lang="en-US"/>
-        </a:p>
-      </dgm:t>
     </dgm:pt>
     <dgm:pt modelId="{BC140B48-2181-4811-AF91-223867D0738E}" type="pres">
       <dgm:prSet presAssocID="{2562C856-622C-43A4-99D0-A7FF0C835EBA}" presName="sibTrans" presStyleCnt="0"/>
@@ -3550,13 +3436,6 @@
           </a:stretch>
         </a:blipFill>
       </dgm:spPr>
-      <dgm:t>
-        <a:bodyPr/>
-        <a:lstStyle/>
-        <a:p>
-          <a:endParaRPr lang="en-US"/>
-        </a:p>
-      </dgm:t>
       <dgm:extLst>
         <a:ext uri="{E40237B7-FDA0-4F09-8148-C483321AD2D9}">
           <dgm14:cNvPr xmlns:dgm14="http://schemas.microsoft.com/office/drawing/2010/diagram" id="0" name="" descr="Close up of students studying in library." title="Sample Picture"/>
@@ -3570,13 +3449,6 @@
         </dgm:presLayoutVars>
       </dgm:prSet>
       <dgm:spPr/>
-      <dgm:t>
-        <a:bodyPr/>
-        <a:lstStyle/>
-        <a:p>
-          <a:endParaRPr lang="en-US"/>
-        </a:p>
-      </dgm:t>
     </dgm:pt>
     <dgm:pt modelId="{B3686B38-0C87-411A-9F82-923E333643FB}" type="pres">
       <dgm:prSet presAssocID="{0F8DBA57-A3BA-4BC9-A853-67B71E3B3531}" presName="Parent" presStyleLbl="alignNode1" presStyleIdx="2" presStyleCnt="4">
@@ -3585,13 +3457,6 @@
         </dgm:presLayoutVars>
       </dgm:prSet>
       <dgm:spPr/>
-      <dgm:t>
-        <a:bodyPr/>
-        <a:lstStyle/>
-        <a:p>
-          <a:endParaRPr lang="en-US"/>
-        </a:p>
-      </dgm:t>
     </dgm:pt>
     <dgm:pt modelId="{0A69584E-ED28-4A81-B130-0E9A2F565C94}" type="pres">
       <dgm:prSet presAssocID="{CD82CFE7-3793-47B0-8B52-9C19EDB40EDE}" presName="sibTrans" presStyleCnt="0"/>
@@ -3622,13 +3487,6 @@
           </a:stretch>
         </a:blipFill>
       </dgm:spPr>
-      <dgm:t>
-        <a:bodyPr/>
-        <a:lstStyle/>
-        <a:p>
-          <a:endParaRPr lang="en-US"/>
-        </a:p>
-      </dgm:t>
       <dgm:extLst>
         <a:ext uri="{E40237B7-FDA0-4F09-8148-C483321AD2D9}">
           <dgm14:cNvPr xmlns:dgm14="http://schemas.microsoft.com/office/drawing/2010/diagram" id="0" name="" descr="Closeup of gloved hand picking up a glass beaker." title="Sample Picture"/>
@@ -3642,13 +3500,6 @@
         </dgm:presLayoutVars>
       </dgm:prSet>
       <dgm:spPr/>
-      <dgm:t>
-        <a:bodyPr/>
-        <a:lstStyle/>
-        <a:p>
-          <a:endParaRPr lang="en-US"/>
-        </a:p>
-      </dgm:t>
     </dgm:pt>
     <dgm:pt modelId="{4E89074A-DD45-4C30-BE68-0847302086FD}" type="pres">
       <dgm:prSet presAssocID="{677FC8B7-2875-43E9-9CDF-1CB72AAB0D0E}" presName="Parent" presStyleLbl="alignNode1" presStyleIdx="3" presStyleCnt="4">
@@ -3657,35 +3508,28 @@
         </dgm:presLayoutVars>
       </dgm:prSet>
       <dgm:spPr/>
-      <dgm:t>
-        <a:bodyPr/>
-        <a:lstStyle/>
-        <a:p>
-          <a:endParaRPr lang="en-US"/>
-        </a:p>
-      </dgm:t>
     </dgm:pt>
   </dgm:ptLst>
   <dgm:cxnLst>
     <dgm:cxn modelId="{E5053C00-76EC-4519-ABF3-0ACDA95BE163}" srcId="{25AFBC85-EE41-46FB-A7F4-99ED4084C835}" destId="{A518A75D-9854-4CDE-9FB7-B1EBB324AAED}" srcOrd="0" destOrd="0" parTransId="{8A2D5E86-42BC-415B-A1DE-0C28EEB3661C}" sibTransId="{FF440F30-5F7D-44F0-8264-C65521A11F0C}"/>
+    <dgm:cxn modelId="{4A4ADF06-6D3D-43CF-9662-53E434EE742F}" type="presOf" srcId="{25AF84C7-6ED7-450C-83EA-4337CE735A70}" destId="{16EEE8E2-3D18-44F6-B04A-3D59841E4FA8}" srcOrd="0" destOrd="0" presId="urn:microsoft.com/office/officeart/2008/layout/TitlePictureLineup"/>
+    <dgm:cxn modelId="{B724B512-D13F-42E5-8E9D-6F0A3CE544D8}" type="presOf" srcId="{48328429-D21F-4CF6-9089-EE3F5F57F2AC}" destId="{5ABBC393-AD16-4772-8402-4ABCB8683B4E}" srcOrd="0" destOrd="0" presId="urn:microsoft.com/office/officeart/2008/layout/TitlePictureLineup"/>
+    <dgm:cxn modelId="{E003B334-5224-4D62-B853-FA481A6CA493}" type="presOf" srcId="{A9B56225-2ADD-49DA-81AC-70F2AF1C4A96}" destId="{2A1C86DE-9AB9-421D-8408-47DA191A0168}" srcOrd="0" destOrd="0" presId="urn:microsoft.com/office/officeart/2008/layout/TitlePictureLineup"/>
+    <dgm:cxn modelId="{21B7AB36-1C2E-4E8E-BAFE-E7BF013A0E25}" srcId="{677FC8B7-2875-43E9-9CDF-1CB72AAB0D0E}" destId="{A9B56225-2ADD-49DA-81AC-70F2AF1C4A96}" srcOrd="0" destOrd="0" parTransId="{0BDA5908-E6FD-4F09-9B29-F0DA4C25A334}" sibTransId="{430BF9A0-6AC4-4B0D-A7AB-5C13328C2783}"/>
+    <dgm:cxn modelId="{951AB036-7A1D-4DCF-8595-B29E9F00F3BE}" type="presOf" srcId="{677FC8B7-2875-43E9-9CDF-1CB72AAB0D0E}" destId="{4E89074A-DD45-4C30-BE68-0847302086FD}" srcOrd="0" destOrd="0" presId="urn:microsoft.com/office/officeart/2008/layout/TitlePictureLineup"/>
     <dgm:cxn modelId="{6A0A065E-D593-4F6E-BB02-BF63EE5BC407}" type="presOf" srcId="{25AFBC85-EE41-46FB-A7F4-99ED4084C835}" destId="{8C6E4A05-D928-421F-BB35-AB0FFEB0B7C4}" srcOrd="0" destOrd="0" presId="urn:microsoft.com/office/officeart/2008/layout/TitlePictureLineup"/>
+    <dgm:cxn modelId="{BC99CF63-34B5-4D4D-84B8-160D4C4D99B0}" type="presOf" srcId="{300FCD3E-1ADF-4D8E-8B7F-C23D248E5AA3}" destId="{A0810939-5D65-4F5C-894F-F86C706A7A1C}" srcOrd="0" destOrd="0" presId="urn:microsoft.com/office/officeart/2008/layout/TitlePictureLineup"/>
+    <dgm:cxn modelId="{9140734E-E639-4086-9B62-F9B15D8D45A9}" type="presOf" srcId="{D0989AE5-C818-44D5-8AE6-32DEAF6F46CC}" destId="{EBE06ADE-C892-44D3-AB90-0EE941CCA21D}" srcOrd="0" destOrd="0" presId="urn:microsoft.com/office/officeart/2008/layout/TitlePictureLineup"/>
+    <dgm:cxn modelId="{447AF68F-5153-4E01-A5A1-8D3A25A73007}" srcId="{25AFBC85-EE41-46FB-A7F4-99ED4084C835}" destId="{25AF84C7-6ED7-450C-83EA-4337CE735A70}" srcOrd="1" destOrd="0" parTransId="{33168ED3-1516-4DE0-87C6-D0BBEBB68307}" sibTransId="{2562C856-622C-43A4-99D0-A7FF0C835EBA}"/>
+    <dgm:cxn modelId="{97DC5797-804D-44AB-A7F2-9EB61CACB1D5}" srcId="{25AFBC85-EE41-46FB-A7F4-99ED4084C835}" destId="{677FC8B7-2875-43E9-9CDF-1CB72AAB0D0E}" srcOrd="3" destOrd="0" parTransId="{135D044B-CF2D-4837-B65C-369AE7EBF5F6}" sibTransId="{76FCE978-AC8C-47A4-866D-929EE0B68914}"/>
+    <dgm:cxn modelId="{0990249C-5F83-4AC6-BBDE-76609E41C3B7}" srcId="{0F8DBA57-A3BA-4BC9-A853-67B71E3B3531}" destId="{D0989AE5-C818-44D5-8AE6-32DEAF6F46CC}" srcOrd="0" destOrd="0" parTransId="{5116A57A-5F5C-441B-8E98-72FC83223934}" sibTransId="{0B13468D-FE4E-4A8A-A598-8159F0C900A0}"/>
+    <dgm:cxn modelId="{C84F12B6-3EE3-4557-A9DE-5ECD9E203BEF}" type="presOf" srcId="{0F8DBA57-A3BA-4BC9-A853-67B71E3B3531}" destId="{B3686B38-0C87-411A-9F82-923E333643FB}" srcOrd="0" destOrd="0" presId="urn:microsoft.com/office/officeart/2008/layout/TitlePictureLineup"/>
+    <dgm:cxn modelId="{81AE50C2-F587-470B-86FC-B5A28EFEE1BC}" srcId="{25AFBC85-EE41-46FB-A7F4-99ED4084C835}" destId="{0F8DBA57-A3BA-4BC9-A853-67B71E3B3531}" srcOrd="2" destOrd="0" parTransId="{99BB5F99-B845-4128-856A-D40FE489F4C0}" sibTransId="{CD82CFE7-3793-47B0-8B52-9C19EDB40EDE}"/>
+    <dgm:cxn modelId="{B7AA9BCE-D649-4F1B-B108-93466D2481F6}" srcId="{A518A75D-9854-4CDE-9FB7-B1EBB324AAED}" destId="{48328429-D21F-4CF6-9089-EE3F5F57F2AC}" srcOrd="0" destOrd="0" parTransId="{1635AB15-42A4-42D6-9F2B-33788AD7A83B}" sibTransId="{C822654F-BF62-47E3-96FD-AE4B604B788B}"/>
+    <dgm:cxn modelId="{CA8B89D3-A3E5-41AB-9C8A-76BEC3920398}" type="presOf" srcId="{A518A75D-9854-4CDE-9FB7-B1EBB324AAED}" destId="{770E20EC-6929-4A45-99D5-285545E37892}" srcOrd="0" destOrd="0" presId="urn:microsoft.com/office/officeart/2008/layout/TitlePictureLineup"/>
+    <dgm:cxn modelId="{4B471AE2-396E-4C5C-9110-4123DA6DCE53}" srcId="{25AF84C7-6ED7-450C-83EA-4337CE735A70}" destId="{300FCD3E-1ADF-4D8E-8B7F-C23D248E5AA3}" srcOrd="0" destOrd="0" parTransId="{BC272908-DB90-4FCA-8784-0CA7E6A97E8F}" sibTransId="{4A78B380-1F85-4365-BF1F-0BD8AD7C8590}"/>
     <dgm:cxn modelId="{04033EED-8DB1-6C40-81C3-2340DC18AAC0}" srcId="{A518A75D-9854-4CDE-9FB7-B1EBB324AAED}" destId="{5F733BB1-0E9D-464E-9AF1-7D1ED1D4436E}" srcOrd="1" destOrd="0" parTransId="{A8A9D014-3B50-8D4A-BD40-9773B5E3920D}" sibTransId="{D07C801F-EC5D-A745-9F46-FD0C18F91C34}"/>
-    <dgm:cxn modelId="{21B7AB36-1C2E-4E8E-BAFE-E7BF013A0E25}" srcId="{677FC8B7-2875-43E9-9CDF-1CB72AAB0D0E}" destId="{A9B56225-2ADD-49DA-81AC-70F2AF1C4A96}" srcOrd="0" destOrd="0" parTransId="{0BDA5908-E6FD-4F09-9B29-F0DA4C25A334}" sibTransId="{430BF9A0-6AC4-4B0D-A7AB-5C13328C2783}"/>
-    <dgm:cxn modelId="{B724B512-D13F-42E5-8E9D-6F0A3CE544D8}" type="presOf" srcId="{48328429-D21F-4CF6-9089-EE3F5F57F2AC}" destId="{5ABBC393-AD16-4772-8402-4ABCB8683B4E}" srcOrd="0" destOrd="0" presId="urn:microsoft.com/office/officeart/2008/layout/TitlePictureLineup"/>
-    <dgm:cxn modelId="{B7AA9BCE-D649-4F1B-B108-93466D2481F6}" srcId="{A518A75D-9854-4CDE-9FB7-B1EBB324AAED}" destId="{48328429-D21F-4CF6-9089-EE3F5F57F2AC}" srcOrd="0" destOrd="0" parTransId="{1635AB15-42A4-42D6-9F2B-33788AD7A83B}" sibTransId="{C822654F-BF62-47E3-96FD-AE4B604B788B}"/>
-    <dgm:cxn modelId="{9140734E-E639-4086-9B62-F9B15D8D45A9}" type="presOf" srcId="{D0989AE5-C818-44D5-8AE6-32DEAF6F46CC}" destId="{EBE06ADE-C892-44D3-AB90-0EE941CCA21D}" srcOrd="0" destOrd="0" presId="urn:microsoft.com/office/officeart/2008/layout/TitlePictureLineup"/>
-    <dgm:cxn modelId="{E003B334-5224-4D62-B853-FA481A6CA493}" type="presOf" srcId="{A9B56225-2ADD-49DA-81AC-70F2AF1C4A96}" destId="{2A1C86DE-9AB9-421D-8408-47DA191A0168}" srcOrd="0" destOrd="0" presId="urn:microsoft.com/office/officeart/2008/layout/TitlePictureLineup"/>
-    <dgm:cxn modelId="{C84F12B6-3EE3-4557-A9DE-5ECD9E203BEF}" type="presOf" srcId="{0F8DBA57-A3BA-4BC9-A853-67B71E3B3531}" destId="{B3686B38-0C87-411A-9F82-923E333643FB}" srcOrd="0" destOrd="0" presId="urn:microsoft.com/office/officeart/2008/layout/TitlePictureLineup"/>
-    <dgm:cxn modelId="{447AF68F-5153-4E01-A5A1-8D3A25A73007}" srcId="{25AFBC85-EE41-46FB-A7F4-99ED4084C835}" destId="{25AF84C7-6ED7-450C-83EA-4337CE735A70}" srcOrd="1" destOrd="0" parTransId="{33168ED3-1516-4DE0-87C6-D0BBEBB68307}" sibTransId="{2562C856-622C-43A4-99D0-A7FF0C835EBA}"/>
-    <dgm:cxn modelId="{0990249C-5F83-4AC6-BBDE-76609E41C3B7}" srcId="{0F8DBA57-A3BA-4BC9-A853-67B71E3B3531}" destId="{D0989AE5-C818-44D5-8AE6-32DEAF6F46CC}" srcOrd="0" destOrd="0" parTransId="{5116A57A-5F5C-441B-8E98-72FC83223934}" sibTransId="{0B13468D-FE4E-4A8A-A598-8159F0C900A0}"/>
-    <dgm:cxn modelId="{4B471AE2-396E-4C5C-9110-4123DA6DCE53}" srcId="{25AF84C7-6ED7-450C-83EA-4337CE735A70}" destId="{300FCD3E-1ADF-4D8E-8B7F-C23D248E5AA3}" srcOrd="0" destOrd="0" parTransId="{BC272908-DB90-4FCA-8784-0CA7E6A97E8F}" sibTransId="{4A78B380-1F85-4365-BF1F-0BD8AD7C8590}"/>
-    <dgm:cxn modelId="{951AB036-7A1D-4DCF-8595-B29E9F00F3BE}" type="presOf" srcId="{677FC8B7-2875-43E9-9CDF-1CB72AAB0D0E}" destId="{4E89074A-DD45-4C30-BE68-0847302086FD}" srcOrd="0" destOrd="0" presId="urn:microsoft.com/office/officeart/2008/layout/TitlePictureLineup"/>
     <dgm:cxn modelId="{4A1C38F0-EE99-5C4F-8E05-0DE90E45B87E}" type="presOf" srcId="{5F733BB1-0E9D-464E-9AF1-7D1ED1D4436E}" destId="{5ABBC393-AD16-4772-8402-4ABCB8683B4E}" srcOrd="0" destOrd="1" presId="urn:microsoft.com/office/officeart/2008/layout/TitlePictureLineup"/>
-    <dgm:cxn modelId="{97DC5797-804D-44AB-A7F2-9EB61CACB1D5}" srcId="{25AFBC85-EE41-46FB-A7F4-99ED4084C835}" destId="{677FC8B7-2875-43E9-9CDF-1CB72AAB0D0E}" srcOrd="3" destOrd="0" parTransId="{135D044B-CF2D-4837-B65C-369AE7EBF5F6}" sibTransId="{76FCE978-AC8C-47A4-866D-929EE0B68914}"/>
-    <dgm:cxn modelId="{4A4ADF06-6D3D-43CF-9662-53E434EE742F}" type="presOf" srcId="{25AF84C7-6ED7-450C-83EA-4337CE735A70}" destId="{16EEE8E2-3D18-44F6-B04A-3D59841E4FA8}" srcOrd="0" destOrd="0" presId="urn:microsoft.com/office/officeart/2008/layout/TitlePictureLineup"/>
-    <dgm:cxn modelId="{CA8B89D3-A3E5-41AB-9C8A-76BEC3920398}" type="presOf" srcId="{A518A75D-9854-4CDE-9FB7-B1EBB324AAED}" destId="{770E20EC-6929-4A45-99D5-285545E37892}" srcOrd="0" destOrd="0" presId="urn:microsoft.com/office/officeart/2008/layout/TitlePictureLineup"/>
-    <dgm:cxn modelId="{BC99CF63-34B5-4D4D-84B8-160D4C4D99B0}" type="presOf" srcId="{300FCD3E-1ADF-4D8E-8B7F-C23D248E5AA3}" destId="{A0810939-5D65-4F5C-894F-F86C706A7A1C}" srcOrd="0" destOrd="0" presId="urn:microsoft.com/office/officeart/2008/layout/TitlePictureLineup"/>
-    <dgm:cxn modelId="{81AE50C2-F587-470B-86FC-B5A28EFEE1BC}" srcId="{25AFBC85-EE41-46FB-A7F4-99ED4084C835}" destId="{0F8DBA57-A3BA-4BC9-A853-67B71E3B3531}" srcOrd="2" destOrd="0" parTransId="{99BB5F99-B845-4128-856A-D40FE489F4C0}" sibTransId="{CD82CFE7-3793-47B0-8B52-9C19EDB40EDE}"/>
     <dgm:cxn modelId="{B5657A53-F7C5-449A-A28C-ADB1BD95AFAD}" type="presParOf" srcId="{8C6E4A05-D928-421F-BB35-AB0FFEB0B7C4}" destId="{8C8EDC2C-400F-4A87-B348-71B90CDC58F1}" srcOrd="0" destOrd="0" presId="urn:microsoft.com/office/officeart/2008/layout/TitlePictureLineup"/>
     <dgm:cxn modelId="{1C80C19B-C14E-453A-AD9B-0F519D412CCB}" type="presParOf" srcId="{8C8EDC2C-400F-4A87-B348-71B90CDC58F1}" destId="{53B4FA82-603E-4EDB-90A9-1DA699C2C901}" srcOrd="0" destOrd="0" presId="urn:microsoft.com/office/officeart/2008/layout/TitlePictureLineup"/>
     <dgm:cxn modelId="{0D6A37DD-154A-4327-B4B3-2A50C24373F9}" type="presParOf" srcId="{8C8EDC2C-400F-4A87-B348-71B90CDC58F1}" destId="{48475A52-D924-4818-BEE8-D250047D6B3F}" srcOrd="1" destOrd="0" presId="urn:microsoft.com/office/officeart/2008/layout/TitlePictureLineup"/>
@@ -3783,7 +3627,7 @@
         </a:bodyPr>
         <a:lstStyle/>
         <a:p>
-          <a:pPr lvl="0" algn="ctr" defTabSz="1244600">
+          <a:pPr marL="0" lvl="0" indent="0" algn="ctr" defTabSz="1244600">
             <a:lnSpc>
               <a:spcPct val="90000"/>
             </a:lnSpc>
@@ -3793,12 +3637,12 @@
             <a:spcAft>
               <a:spcPct val="35000"/>
             </a:spcAft>
+            <a:buNone/>
           </a:pPr>
           <a:r>
-            <a:rPr lang="en-US" sz="2800" kern="1200" dirty="0" smtClean="0"/>
-            <a:t>User category 1</a:t>
+            <a:rPr lang="en-US" sz="2800" kern="1200" dirty="0"/>
+            <a:t>User category xx</a:t>
           </a:r>
-          <a:endParaRPr lang="en-US" sz="2800" kern="1200" dirty="0"/>
         </a:p>
       </dsp:txBody>
       <dsp:txXfrm>
@@ -3873,13 +3717,12 @@
             <a:spcAft>
               <a:spcPct val="15000"/>
             </a:spcAft>
-            <a:buChar char="••"/>
+            <a:buChar char="•"/>
           </a:pPr>
           <a:r>
-            <a:rPr lang="en-US" sz="2800" kern="1200" dirty="0" smtClean="0"/>
+            <a:rPr lang="en-US" sz="2800" kern="1200" dirty="0"/>
             <a:t>State what they will use the  system for</a:t>
           </a:r>
-          <a:endParaRPr lang="en-US" sz="2800" kern="1200" dirty="0"/>
         </a:p>
       </dsp:txBody>
       <dsp:txXfrm>
@@ -3942,7 +3785,7 @@
         </a:bodyPr>
         <a:lstStyle/>
         <a:p>
-          <a:pPr lvl="0" algn="ctr" defTabSz="1244600">
+          <a:pPr marL="0" lvl="0" indent="0" algn="ctr" defTabSz="1244600">
             <a:lnSpc>
               <a:spcPct val="90000"/>
             </a:lnSpc>
@@ -3952,20 +3795,12 @@
             <a:spcAft>
               <a:spcPct val="35000"/>
             </a:spcAft>
+            <a:buNone/>
           </a:pPr>
           <a:r>
-            <a:rPr lang="en-US" sz="2800" kern="1200" dirty="0" smtClean="0"/>
-            <a:t>User </a:t>
+            <a:rPr lang="en-US" sz="2800" kern="1200" dirty="0"/>
+            <a:t>User category xx</a:t>
           </a:r>
-          <a:r>
-            <a:rPr lang="en-US" sz="2800" kern="1200" dirty="0" err="1" smtClean="0"/>
-            <a:t>cateory</a:t>
-          </a:r>
-          <a:r>
-            <a:rPr lang="en-US" sz="2800" kern="1200" dirty="0" smtClean="0"/>
-            <a:t> 2</a:t>
-          </a:r>
-          <a:endParaRPr lang="en-US" sz="2800" kern="1200" dirty="0"/>
         </a:p>
       </dsp:txBody>
       <dsp:txXfrm>
@@ -4040,13 +3875,12 @@
             <a:spcAft>
               <a:spcPct val="15000"/>
             </a:spcAft>
-            <a:buChar char="••"/>
+            <a:buChar char="•"/>
           </a:pPr>
           <a:r>
-            <a:rPr lang="en-US" sz="2800" kern="1200" dirty="0" smtClean="0"/>
+            <a:rPr lang="en-US" sz="2800" kern="1200" dirty="0"/>
             <a:t>State what they will use the  system for</a:t>
           </a:r>
-          <a:endParaRPr lang="en-US" sz="2800" kern="1200" dirty="0"/>
         </a:p>
       </dsp:txBody>
       <dsp:txXfrm>
@@ -4109,7 +3943,7 @@
         </a:bodyPr>
         <a:lstStyle/>
         <a:p>
-          <a:pPr lvl="0" algn="ctr" defTabSz="1244600">
+          <a:pPr marL="0" lvl="0" indent="0" algn="ctr" defTabSz="1244600">
             <a:lnSpc>
               <a:spcPct val="90000"/>
             </a:lnSpc>
@@ -4119,20 +3953,12 @@
             <a:spcAft>
               <a:spcPct val="35000"/>
             </a:spcAft>
+            <a:buNone/>
           </a:pPr>
           <a:r>
-            <a:rPr lang="en-US" sz="2800" kern="1200" dirty="0" smtClean="0"/>
-            <a:t>User </a:t>
+            <a:rPr lang="en-US" sz="2800" kern="1200" dirty="0"/>
+            <a:t>User category xx</a:t>
           </a:r>
-          <a:r>
-            <a:rPr lang="en-US" sz="2800" kern="1200" dirty="0" err="1" smtClean="0"/>
-            <a:t>categor</a:t>
-          </a:r>
-          <a:r>
-            <a:rPr lang="en-US" sz="2800" kern="1200" dirty="0" smtClean="0"/>
-            <a:t> xx</a:t>
-          </a:r>
-          <a:endParaRPr lang="en-US" sz="2800" kern="1200" dirty="0"/>
         </a:p>
       </dsp:txBody>
       <dsp:txXfrm>
@@ -4207,13 +4033,12 @@
             <a:spcAft>
               <a:spcPct val="15000"/>
             </a:spcAft>
-            <a:buChar char="••"/>
+            <a:buChar char="•"/>
           </a:pPr>
           <a:r>
-            <a:rPr lang="en-US" sz="2800" kern="1200" dirty="0" smtClean="0"/>
+            <a:rPr lang="en-US" sz="2800" kern="1200" dirty="0"/>
             <a:t>State what they will use the  system for</a:t>
           </a:r>
-          <a:endParaRPr lang="en-US" sz="2800" kern="1200" dirty="0"/>
         </a:p>
       </dsp:txBody>
       <dsp:txXfrm>
@@ -4384,13 +4209,12 @@
             <a:spcAft>
               <a:spcPct val="15000"/>
             </a:spcAft>
-            <a:buChar char="••"/>
+            <a:buChar char="•"/>
           </a:pPr>
           <a:r>
-            <a:rPr lang="en-US" sz="2800" kern="1200" dirty="0" smtClean="0"/>
+            <a:rPr lang="en-US" sz="2800" kern="1200" dirty="0"/>
             <a:t>Show key components of your system</a:t>
           </a:r>
-          <a:endParaRPr lang="en-US" sz="2800" kern="1200" dirty="0"/>
         </a:p>
         <a:p>
           <a:pPr marL="285750" lvl="1" indent="-285750" algn="l" defTabSz="1244600">
@@ -4403,7 +4227,7 @@
             <a:spcAft>
               <a:spcPct val="15000"/>
             </a:spcAft>
-            <a:buChar char="••"/>
+            <a:buChar char="•"/>
           </a:pPr>
           <a:endParaRPr lang="en-US" sz="2800" kern="1200" dirty="0"/>
         </a:p>
@@ -4468,7 +4292,7 @@
         </a:bodyPr>
         <a:lstStyle/>
         <a:p>
-          <a:pPr lvl="0" algn="ctr" defTabSz="1333500">
+          <a:pPr marL="0" lvl="0" indent="0" algn="ctr" defTabSz="1333500">
             <a:lnSpc>
               <a:spcPct val="90000"/>
             </a:lnSpc>
@@ -4478,12 +4302,12 @@
             <a:spcAft>
               <a:spcPct val="35000"/>
             </a:spcAft>
+            <a:buNone/>
           </a:pPr>
           <a:r>
-            <a:rPr lang="en-US" sz="3000" kern="1200" dirty="0" smtClean="0"/>
+            <a:rPr lang="en-US" sz="3000" kern="1200" dirty="0"/>
             <a:t>Step 1</a:t>
           </a:r>
-          <a:endParaRPr lang="en-US" sz="3000" kern="1200" dirty="0"/>
         </a:p>
       </dsp:txBody>
       <dsp:txXfrm>
@@ -4632,7 +4456,7 @@
         </a:bodyPr>
         <a:lstStyle/>
         <a:p>
-          <a:pPr lvl="0" algn="ctr" defTabSz="1600200">
+          <a:pPr marL="0" lvl="0" indent="0" algn="ctr" defTabSz="1600200">
             <a:lnSpc>
               <a:spcPct val="90000"/>
             </a:lnSpc>
@@ -4642,9 +4466,10 @@
             <a:spcAft>
               <a:spcPct val="35000"/>
             </a:spcAft>
+            <a:buNone/>
           </a:pPr>
           <a:r>
-            <a:rPr lang="en-US" sz="3600" kern="1200" smtClean="0"/>
+            <a:rPr lang="en-US" sz="3600" kern="1200"/>
             <a:t>Describe this step in your experiment</a:t>
           </a:r>
           <a:endParaRPr lang="en-US" sz="3600" kern="1200" dirty="0"/>
@@ -4710,7 +4535,7 @@
         </a:bodyPr>
         <a:lstStyle/>
         <a:p>
-          <a:pPr lvl="0" algn="ctr" defTabSz="1333500">
+          <a:pPr marL="0" lvl="0" indent="0" algn="ctr" defTabSz="1333500">
             <a:lnSpc>
               <a:spcPct val="90000"/>
             </a:lnSpc>
@@ -4720,12 +4545,12 @@
             <a:spcAft>
               <a:spcPct val="35000"/>
             </a:spcAft>
+            <a:buNone/>
           </a:pPr>
           <a:r>
-            <a:rPr lang="en-US" sz="3000" kern="1200" dirty="0" smtClean="0"/>
+            <a:rPr lang="en-US" sz="3000" kern="1200" dirty="0"/>
             <a:t>Step 2</a:t>
           </a:r>
-          <a:endParaRPr lang="en-US" sz="3000" kern="1200" dirty="0"/>
         </a:p>
       </dsp:txBody>
       <dsp:txXfrm>
@@ -4874,7 +4699,7 @@
         </a:bodyPr>
         <a:lstStyle/>
         <a:p>
-          <a:pPr lvl="0" algn="ctr" defTabSz="1600200">
+          <a:pPr marL="0" lvl="0" indent="0" algn="ctr" defTabSz="1600200">
             <a:lnSpc>
               <a:spcPct val="90000"/>
             </a:lnSpc>
@@ -4884,12 +4709,12 @@
             <a:spcAft>
               <a:spcPct val="35000"/>
             </a:spcAft>
+            <a:buNone/>
           </a:pPr>
           <a:r>
-            <a:rPr lang="en-US" sz="3600" kern="1200" dirty="0" smtClean="0"/>
+            <a:rPr lang="en-US" sz="3600" kern="1200" dirty="0"/>
             <a:t>Describe this step in your experiment</a:t>
           </a:r>
-          <a:endParaRPr lang="en-US" sz="3600" kern="1200" dirty="0"/>
         </a:p>
       </dsp:txBody>
       <dsp:txXfrm>
@@ -4952,7 +4777,7 @@
         </a:bodyPr>
         <a:lstStyle/>
         <a:p>
-          <a:pPr lvl="0" algn="ctr" defTabSz="1333500">
+          <a:pPr marL="0" lvl="0" indent="0" algn="ctr" defTabSz="1333500">
             <a:lnSpc>
               <a:spcPct val="90000"/>
             </a:lnSpc>
@@ -4962,12 +4787,12 @@
             <a:spcAft>
               <a:spcPct val="35000"/>
             </a:spcAft>
+            <a:buNone/>
           </a:pPr>
           <a:r>
-            <a:rPr lang="en-US" sz="3000" kern="1200" dirty="0" smtClean="0"/>
+            <a:rPr lang="en-US" sz="3000" kern="1200" dirty="0"/>
             <a:t>Step 3</a:t>
           </a:r>
-          <a:endParaRPr lang="en-US" sz="3000" kern="1200" dirty="0"/>
         </a:p>
       </dsp:txBody>
       <dsp:txXfrm>
@@ -5116,7 +4941,7 @@
         </a:bodyPr>
         <a:lstStyle/>
         <a:p>
-          <a:pPr lvl="0" algn="ctr" defTabSz="1600200">
+          <a:pPr marL="0" lvl="0" indent="0" algn="ctr" defTabSz="1600200">
             <a:lnSpc>
               <a:spcPct val="90000"/>
             </a:lnSpc>
@@ -5126,12 +4951,12 @@
             <a:spcAft>
               <a:spcPct val="35000"/>
             </a:spcAft>
+            <a:buNone/>
           </a:pPr>
           <a:r>
-            <a:rPr lang="en-US" sz="3600" kern="1200" dirty="0" smtClean="0"/>
+            <a:rPr lang="en-US" sz="3600" kern="1200" dirty="0"/>
             <a:t>Describe this step in your experiment</a:t>
           </a:r>
-          <a:endParaRPr lang="en-US" sz="3600" kern="1200" dirty="0"/>
         </a:p>
       </dsp:txBody>
       <dsp:txXfrm>
@@ -5194,7 +5019,7 @@
         </a:bodyPr>
         <a:lstStyle/>
         <a:p>
-          <a:pPr lvl="0" algn="ctr" defTabSz="1333500">
+          <a:pPr marL="0" lvl="0" indent="0" algn="ctr" defTabSz="1333500">
             <a:lnSpc>
               <a:spcPct val="90000"/>
             </a:lnSpc>
@@ -5204,12 +5029,12 @@
             <a:spcAft>
               <a:spcPct val="35000"/>
             </a:spcAft>
+            <a:buNone/>
           </a:pPr>
           <a:r>
-            <a:rPr lang="en-US" sz="3000" kern="1200" dirty="0" smtClean="0"/>
+            <a:rPr lang="en-US" sz="3000" kern="1200" dirty="0"/>
             <a:t>Step 4</a:t>
           </a:r>
-          <a:endParaRPr lang="en-US" sz="3000" kern="1200" dirty="0"/>
         </a:p>
       </dsp:txBody>
       <dsp:txXfrm>
@@ -7878,7 +7703,7 @@
           <a:p>
             <a:fld id="{F1C0B079-A316-4C9B-B165-DF9EA8325D2C}" type="datetimeFigureOut">
               <a:rPr lang="en-US" smtClean="0"/>
-              <a:t>12/10/2019</a:t>
+              <a:t>12/12/2019</a:t>
             </a:fld>
             <a:endParaRPr lang="en-US"/>
           </a:p>
@@ -8043,7 +7868,7 @@
           <a:p>
             <a:fld id="{38F28AB8-57D1-494F-9851-055AD867E790}" type="datetimeFigureOut">
               <a:rPr lang="en-US" smtClean="0"/>
-              <a:t>12/10/2019</a:t>
+              <a:t>12/12/2019</a:t>
             </a:fld>
             <a:endParaRPr lang="en-US"/>
           </a:p>
@@ -8107,38 +7932,37 @@
           <a:p>
             <a:pPr lvl="0"/>
             <a:r>
-              <a:rPr lang="en-US" smtClean="0"/>
+              <a:rPr lang="en-US"/>
               <a:t>Click to edit Master text styles</a:t>
             </a:r>
           </a:p>
           <a:p>
             <a:pPr lvl="1"/>
             <a:r>
-              <a:rPr lang="en-US" smtClean="0"/>
+              <a:rPr lang="en-US"/>
               <a:t>Second level</a:t>
             </a:r>
           </a:p>
           <a:p>
             <a:pPr lvl="2"/>
             <a:r>
-              <a:rPr lang="en-US" smtClean="0"/>
+              <a:rPr lang="en-US"/>
               <a:t>Third level</a:t>
             </a:r>
           </a:p>
           <a:p>
             <a:pPr lvl="3"/>
             <a:r>
-              <a:rPr lang="en-US" smtClean="0"/>
+              <a:rPr lang="en-US"/>
               <a:t>Fourth level</a:t>
             </a:r>
           </a:p>
           <a:p>
             <a:pPr lvl="4"/>
             <a:r>
-              <a:rPr lang="en-US" smtClean="0"/>
+              <a:rPr lang="en-US"/>
               <a:t>Fifth level</a:t>
             </a:r>
-            <a:endParaRPr lang="en-US"/>
           </a:p>
         </p:txBody>
       </p:sp>
@@ -8361,19 +8185,11 @@
             </a:r>
             <a:r>
               <a:rPr lang="en-US"/>
-              <a:t>this </a:t>
-            </a:r>
-            <a:r>
-              <a:rPr lang="en-US" smtClean="0"/>
-              <a:t>poster, </a:t>
+              <a:t>this poster, </a:t>
             </a:r>
             <a:r>
               <a:rPr lang="en-US" dirty="0"/>
-              <a:t>replace our sample content with your own. Or, if you'd rather start from a clean slate, press the New Slide button on the Home tab to insert a new page. Now enter your text and pictures in the empty placeholders. If you need more placeholders for titles, subtitles or body text, copy any of the existing placeholders, then drag the new one into place</a:t>
-            </a:r>
-            <a:r>
-              <a:rPr lang="en-US" dirty="0" smtClean="0"/>
-              <a:t>.</a:t>
+              <a:t>replace our sample content with your own. Or, if you'd rather start from a clean slate, press the New Slide button on the Home tab to insert a new page. Now enter your text and pictures in the empty placeholders. If you need more placeholders for titles, subtitles or body text, copy any of the existing placeholders, then drag the new one into place.</a:t>
             </a:r>
           </a:p>
         </p:txBody>
@@ -8447,10 +8263,9 @@
           <a:lstStyle/>
           <a:p>
             <a:r>
-              <a:rPr lang="en-US" smtClean="0"/>
+              <a:rPr lang="en-US"/>
               <a:t>Click to edit Master title style</a:t>
             </a:r>
-            <a:endParaRPr lang="en-US"/>
           </a:p>
         </p:txBody>
       </p:sp>
@@ -8580,7 +8395,7 @@
           <a:p>
             <a:pPr lvl="0"/>
             <a:r>
-              <a:rPr lang="en-US" smtClean="0"/>
+              <a:rPr lang="en-US"/>
               <a:t>Click to edit Master text styles</a:t>
             </a:r>
           </a:p>
@@ -8745,10 +8560,9 @@
           <a:p>
             <a:pPr lvl="0"/>
             <a:r>
-              <a:rPr lang="en-US" dirty="0" smtClean="0"/>
+              <a:rPr lang="en-US" dirty="0"/>
               <a:t>Heading</a:t>
             </a:r>
-            <a:endParaRPr lang="en-US" dirty="0"/>
           </a:p>
         </p:txBody>
       </p:sp>
@@ -8849,10 +8663,9 @@
           <a:p>
             <a:pPr lvl="0"/>
             <a:r>
-              <a:rPr lang="en-US" dirty="0" smtClean="0"/>
+              <a:rPr lang="en-US" dirty="0"/>
               <a:t>Add your question or a statement of the problem here</a:t>
             </a:r>
-            <a:endParaRPr lang="en-US" dirty="0"/>
           </a:p>
         </p:txBody>
       </p:sp>
@@ -9015,10 +8828,9 @@
           <a:p>
             <a:pPr lvl="0"/>
             <a:r>
-              <a:rPr lang="en-US" dirty="0" smtClean="0"/>
+              <a:rPr lang="en-US" dirty="0"/>
               <a:t>Heading</a:t>
             </a:r>
-            <a:endParaRPr lang="en-US" dirty="0"/>
           </a:p>
         </p:txBody>
       </p:sp>
@@ -9072,28 +8884,28 @@
           <a:p>
             <a:pPr lvl="0"/>
             <a:r>
-              <a:rPr lang="en-US" dirty="0" smtClean="0"/>
+              <a:rPr lang="en-US" dirty="0"/>
               <a:t>Use this placeholder to add text or other content</a:t>
             </a:r>
           </a:p>
           <a:p>
             <a:pPr lvl="1"/>
             <a:r>
-              <a:rPr lang="en-US" dirty="0" smtClean="0"/>
+              <a:rPr lang="en-US" dirty="0"/>
               <a:t>Second level</a:t>
             </a:r>
           </a:p>
           <a:p>
             <a:pPr lvl="2"/>
             <a:r>
-              <a:rPr lang="en-US" dirty="0" smtClean="0"/>
+              <a:rPr lang="en-US" dirty="0"/>
               <a:t>Third level</a:t>
             </a:r>
           </a:p>
           <a:p>
             <a:pPr lvl="3"/>
             <a:r>
-              <a:rPr lang="en-US" dirty="0" smtClean="0"/>
+              <a:rPr lang="en-US" dirty="0"/>
               <a:t>Fourth level</a:t>
             </a:r>
           </a:p>
@@ -9258,10 +9070,9 @@
           <a:p>
             <a:pPr lvl="0"/>
             <a:r>
-              <a:rPr lang="en-US" dirty="0" smtClean="0"/>
+              <a:rPr lang="en-US" dirty="0"/>
               <a:t>Heading</a:t>
             </a:r>
-            <a:endParaRPr lang="en-US" dirty="0"/>
           </a:p>
         </p:txBody>
       </p:sp>
@@ -9315,66 +9126,65 @@
           <a:p>
             <a:pPr lvl="0"/>
             <a:r>
-              <a:rPr lang="en-US" dirty="0" smtClean="0"/>
+              <a:rPr lang="en-US" dirty="0"/>
               <a:t>Use this placeholder to add text or other content</a:t>
             </a:r>
           </a:p>
           <a:p>
             <a:pPr lvl="1"/>
             <a:r>
-              <a:rPr lang="en-US" dirty="0" smtClean="0"/>
+              <a:rPr lang="en-US" dirty="0"/>
               <a:t>Second level</a:t>
             </a:r>
           </a:p>
           <a:p>
             <a:pPr lvl="2"/>
             <a:r>
-              <a:rPr lang="en-US" dirty="0" smtClean="0"/>
+              <a:rPr lang="en-US" dirty="0"/>
               <a:t>Third level</a:t>
             </a:r>
           </a:p>
           <a:p>
             <a:pPr lvl="3"/>
             <a:r>
-              <a:rPr lang="en-US" dirty="0" smtClean="0"/>
+              <a:rPr lang="en-US" dirty="0"/>
               <a:t>Fourth level</a:t>
             </a:r>
           </a:p>
           <a:p>
             <a:pPr lvl="4"/>
             <a:r>
-              <a:rPr lang="en-US" dirty="0" smtClean="0"/>
+              <a:rPr lang="en-US" dirty="0"/>
               <a:t>Fifth level</a:t>
             </a:r>
           </a:p>
           <a:p>
             <a:pPr lvl="5"/>
             <a:r>
-              <a:rPr lang="en-US" dirty="0" smtClean="0"/>
+              <a:rPr lang="en-US" dirty="0"/>
               <a:t>Six</a:t>
             </a:r>
           </a:p>
           <a:p>
             <a:pPr lvl="6"/>
             <a:r>
-              <a:rPr lang="en-US" dirty="0" smtClean="0"/>
+              <a:rPr lang="en-US" dirty="0"/>
               <a:t>Seven</a:t>
             </a:r>
           </a:p>
           <a:p>
             <a:pPr lvl="7"/>
             <a:r>
-              <a:rPr lang="en-US" dirty="0" smtClean="0"/>
+              <a:rPr lang="en-US" dirty="0"/>
               <a:t>Eight</a:t>
             </a:r>
           </a:p>
           <a:p>
             <a:pPr lvl="8"/>
             <a:r>
-              <a:rPr lang="en-US" dirty="0" smtClean="0"/>
+              <a:rPr lang="en-US" dirty="0"/>
               <a:t>Nine</a:t>
             </a:r>
-            <a:endParaRPr lang="en-US" dirty="0"/>
           </a:p>
         </p:txBody>
       </p:sp>
@@ -9537,10 +9347,9 @@
           <a:p>
             <a:pPr lvl="0"/>
             <a:r>
-              <a:rPr lang="en-US" dirty="0" smtClean="0"/>
+              <a:rPr lang="en-US" dirty="0"/>
               <a:t>Heading</a:t>
             </a:r>
-            <a:endParaRPr lang="en-US" dirty="0"/>
           </a:p>
         </p:txBody>
       </p:sp>
@@ -9594,66 +9403,65 @@
           <a:p>
             <a:pPr lvl="0"/>
             <a:r>
-              <a:rPr lang="en-US" dirty="0" smtClean="0"/>
+              <a:rPr lang="en-US" dirty="0"/>
               <a:t>Use this placeholder to add text or other content</a:t>
             </a:r>
           </a:p>
           <a:p>
             <a:pPr lvl="1"/>
             <a:r>
-              <a:rPr lang="en-US" dirty="0" smtClean="0"/>
+              <a:rPr lang="en-US" dirty="0"/>
               <a:t>Second level</a:t>
             </a:r>
           </a:p>
           <a:p>
             <a:pPr lvl="2"/>
             <a:r>
-              <a:rPr lang="en-US" dirty="0" smtClean="0"/>
+              <a:rPr lang="en-US" dirty="0"/>
               <a:t>Third level</a:t>
             </a:r>
           </a:p>
           <a:p>
             <a:pPr lvl="3"/>
             <a:r>
-              <a:rPr lang="en-US" dirty="0" smtClean="0"/>
+              <a:rPr lang="en-US" dirty="0"/>
               <a:t>Fourth level</a:t>
             </a:r>
           </a:p>
           <a:p>
             <a:pPr lvl="4"/>
             <a:r>
-              <a:rPr lang="en-US" dirty="0" smtClean="0"/>
+              <a:rPr lang="en-US" dirty="0"/>
               <a:t>Fifth level</a:t>
             </a:r>
           </a:p>
           <a:p>
             <a:pPr lvl="5"/>
             <a:r>
-              <a:rPr lang="en-US" dirty="0" smtClean="0"/>
+              <a:rPr lang="en-US" dirty="0"/>
               <a:t>Six</a:t>
             </a:r>
           </a:p>
           <a:p>
             <a:pPr lvl="6"/>
             <a:r>
-              <a:rPr lang="en-US" dirty="0" smtClean="0"/>
+              <a:rPr lang="en-US" dirty="0"/>
               <a:t>Seven</a:t>
             </a:r>
           </a:p>
           <a:p>
             <a:pPr lvl="7"/>
             <a:r>
-              <a:rPr lang="en-US" dirty="0" smtClean="0"/>
+              <a:rPr lang="en-US" dirty="0"/>
               <a:t>Eight</a:t>
             </a:r>
           </a:p>
           <a:p>
             <a:pPr lvl="8"/>
             <a:r>
-              <a:rPr lang="en-US" dirty="0" smtClean="0"/>
+              <a:rPr lang="en-US" dirty="0"/>
               <a:t>Nine</a:t>
             </a:r>
-            <a:endParaRPr lang="en-US" dirty="0"/>
           </a:p>
         </p:txBody>
       </p:sp>
@@ -9816,10 +9624,9 @@
           <a:p>
             <a:pPr lvl="0"/>
             <a:r>
-              <a:rPr lang="en-US" dirty="0" smtClean="0"/>
+              <a:rPr lang="en-US" dirty="0"/>
               <a:t>Heading</a:t>
             </a:r>
-            <a:endParaRPr lang="en-US" dirty="0"/>
           </a:p>
         </p:txBody>
       </p:sp>
@@ -9873,66 +9680,65 @@
           <a:p>
             <a:pPr lvl="0"/>
             <a:r>
-              <a:rPr lang="en-US" dirty="0" smtClean="0"/>
+              <a:rPr lang="en-US" dirty="0"/>
               <a:t>Use this placeholder to add text or other content</a:t>
             </a:r>
           </a:p>
           <a:p>
             <a:pPr lvl="1"/>
             <a:r>
-              <a:rPr lang="en-US" dirty="0" smtClean="0"/>
+              <a:rPr lang="en-US" dirty="0"/>
               <a:t>Second level</a:t>
             </a:r>
           </a:p>
           <a:p>
             <a:pPr lvl="2"/>
             <a:r>
-              <a:rPr lang="en-US" dirty="0" smtClean="0"/>
+              <a:rPr lang="en-US" dirty="0"/>
               <a:t>Third level</a:t>
             </a:r>
           </a:p>
           <a:p>
             <a:pPr lvl="3"/>
             <a:r>
-              <a:rPr lang="en-US" dirty="0" smtClean="0"/>
+              <a:rPr lang="en-US" dirty="0"/>
               <a:t>Fourth level</a:t>
             </a:r>
           </a:p>
           <a:p>
             <a:pPr lvl="4"/>
             <a:r>
-              <a:rPr lang="en-US" dirty="0" smtClean="0"/>
+              <a:rPr lang="en-US" dirty="0"/>
               <a:t>Fifth level</a:t>
             </a:r>
           </a:p>
           <a:p>
             <a:pPr lvl="5"/>
             <a:r>
-              <a:rPr lang="en-US" dirty="0" smtClean="0"/>
+              <a:rPr lang="en-US" dirty="0"/>
               <a:t>Six</a:t>
             </a:r>
           </a:p>
           <a:p>
             <a:pPr lvl="6"/>
             <a:r>
-              <a:rPr lang="en-US" dirty="0" smtClean="0"/>
+              <a:rPr lang="en-US" dirty="0"/>
               <a:t>Seven</a:t>
             </a:r>
           </a:p>
           <a:p>
             <a:pPr lvl="7"/>
             <a:r>
-              <a:rPr lang="en-US" dirty="0" smtClean="0"/>
+              <a:rPr lang="en-US" dirty="0"/>
               <a:t>Eight</a:t>
             </a:r>
           </a:p>
           <a:p>
             <a:pPr lvl="8"/>
             <a:r>
-              <a:rPr lang="en-US" dirty="0" smtClean="0"/>
+              <a:rPr lang="en-US" dirty="0"/>
               <a:t>Nine</a:t>
             </a:r>
-            <a:endParaRPr lang="en-US" dirty="0"/>
           </a:p>
         </p:txBody>
       </p:sp>
@@ -10095,10 +9901,9 @@
           <a:p>
             <a:pPr lvl="0"/>
             <a:r>
-              <a:rPr lang="en-US" dirty="0" smtClean="0"/>
+              <a:rPr lang="en-US" dirty="0"/>
               <a:t>Heading</a:t>
             </a:r>
-            <a:endParaRPr lang="en-US" dirty="0"/>
           </a:p>
         </p:txBody>
       </p:sp>
@@ -10152,66 +9957,65 @@
           <a:p>
             <a:pPr lvl="0"/>
             <a:r>
-              <a:rPr lang="en-US" dirty="0" smtClean="0"/>
+              <a:rPr lang="en-US" dirty="0"/>
               <a:t>Use this placeholder to add text or other content</a:t>
             </a:r>
           </a:p>
           <a:p>
             <a:pPr lvl="1"/>
             <a:r>
-              <a:rPr lang="en-US" dirty="0" smtClean="0"/>
+              <a:rPr lang="en-US" dirty="0"/>
               <a:t>Second level</a:t>
             </a:r>
           </a:p>
           <a:p>
             <a:pPr lvl="2"/>
             <a:r>
-              <a:rPr lang="en-US" dirty="0" smtClean="0"/>
+              <a:rPr lang="en-US" dirty="0"/>
               <a:t>Third level</a:t>
             </a:r>
           </a:p>
           <a:p>
             <a:pPr lvl="3"/>
             <a:r>
-              <a:rPr lang="en-US" dirty="0" smtClean="0"/>
+              <a:rPr lang="en-US" dirty="0"/>
               <a:t>Fourth level</a:t>
             </a:r>
           </a:p>
           <a:p>
             <a:pPr lvl="4"/>
             <a:r>
-              <a:rPr lang="en-US" dirty="0" smtClean="0"/>
+              <a:rPr lang="en-US" dirty="0"/>
               <a:t>Fifth level</a:t>
             </a:r>
           </a:p>
           <a:p>
             <a:pPr lvl="5"/>
             <a:r>
-              <a:rPr lang="en-US" dirty="0" smtClean="0"/>
+              <a:rPr lang="en-US" dirty="0"/>
               <a:t>Six</a:t>
             </a:r>
           </a:p>
           <a:p>
             <a:pPr lvl="6"/>
             <a:r>
-              <a:rPr lang="en-US" dirty="0" smtClean="0"/>
+              <a:rPr lang="en-US" dirty="0"/>
               <a:t>Seven</a:t>
             </a:r>
           </a:p>
           <a:p>
             <a:pPr lvl="7"/>
             <a:r>
-              <a:rPr lang="en-US" dirty="0" smtClean="0"/>
+              <a:rPr lang="en-US" dirty="0"/>
               <a:t>Eight</a:t>
             </a:r>
           </a:p>
           <a:p>
             <a:pPr lvl="8"/>
             <a:r>
-              <a:rPr lang="en-US" dirty="0" smtClean="0"/>
+              <a:rPr lang="en-US" dirty="0"/>
               <a:t>Nine</a:t>
             </a:r>
-            <a:endParaRPr lang="en-US" dirty="0"/>
           </a:p>
         </p:txBody>
       </p:sp>
@@ -10374,10 +10178,9 @@
           <a:p>
             <a:pPr lvl="0"/>
             <a:r>
-              <a:rPr lang="en-US" dirty="0" smtClean="0"/>
+              <a:rPr lang="en-US" dirty="0"/>
               <a:t>Heading</a:t>
             </a:r>
-            <a:endParaRPr lang="en-US" dirty="0"/>
           </a:p>
         </p:txBody>
       </p:sp>
@@ -10431,66 +10234,65 @@
           <a:p>
             <a:pPr lvl="0"/>
             <a:r>
-              <a:rPr lang="en-US" dirty="0" smtClean="0"/>
+              <a:rPr lang="en-US" dirty="0"/>
               <a:t>Use this placeholder to add text or other content</a:t>
             </a:r>
           </a:p>
           <a:p>
             <a:pPr lvl="1"/>
             <a:r>
-              <a:rPr lang="en-US" dirty="0" smtClean="0"/>
+              <a:rPr lang="en-US" dirty="0"/>
               <a:t>Second level</a:t>
             </a:r>
           </a:p>
           <a:p>
             <a:pPr lvl="2"/>
             <a:r>
-              <a:rPr lang="en-US" dirty="0" smtClean="0"/>
+              <a:rPr lang="en-US" dirty="0"/>
               <a:t>Third level</a:t>
             </a:r>
           </a:p>
           <a:p>
             <a:pPr lvl="3"/>
             <a:r>
-              <a:rPr lang="en-US" dirty="0" smtClean="0"/>
+              <a:rPr lang="en-US" dirty="0"/>
               <a:t>Fourth level</a:t>
             </a:r>
           </a:p>
           <a:p>
             <a:pPr lvl="4"/>
             <a:r>
-              <a:rPr lang="en-US" dirty="0" smtClean="0"/>
+              <a:rPr lang="en-US" dirty="0"/>
               <a:t>Fifth level</a:t>
             </a:r>
           </a:p>
           <a:p>
             <a:pPr lvl="5"/>
             <a:r>
-              <a:rPr lang="en-US" dirty="0" smtClean="0"/>
+              <a:rPr lang="en-US" dirty="0"/>
               <a:t>Six</a:t>
             </a:r>
           </a:p>
           <a:p>
             <a:pPr lvl="6"/>
             <a:r>
-              <a:rPr lang="en-US" dirty="0" smtClean="0"/>
+              <a:rPr lang="en-US" dirty="0"/>
               <a:t>Seven</a:t>
             </a:r>
           </a:p>
           <a:p>
             <a:pPr lvl="7"/>
             <a:r>
-              <a:rPr lang="en-US" dirty="0" smtClean="0"/>
+              <a:rPr lang="en-US" dirty="0"/>
               <a:t>Eight</a:t>
             </a:r>
           </a:p>
           <a:p>
             <a:pPr lvl="8"/>
             <a:r>
-              <a:rPr lang="en-US" dirty="0" smtClean="0"/>
+              <a:rPr lang="en-US" dirty="0"/>
               <a:t>Nine</a:t>
             </a:r>
-            <a:endParaRPr lang="en-US" dirty="0"/>
           </a:p>
         </p:txBody>
       </p:sp>
@@ -10653,10 +10455,9 @@
           <a:p>
             <a:pPr lvl="0"/>
             <a:r>
-              <a:rPr lang="en-US" dirty="0" smtClean="0"/>
+              <a:rPr lang="en-US" dirty="0"/>
               <a:t>Heading</a:t>
             </a:r>
-            <a:endParaRPr lang="en-US" dirty="0"/>
           </a:p>
         </p:txBody>
       </p:sp>
@@ -10710,66 +10511,65 @@
           <a:p>
             <a:pPr lvl="0"/>
             <a:r>
-              <a:rPr lang="en-US" dirty="0" smtClean="0"/>
+              <a:rPr lang="en-US" dirty="0"/>
               <a:t>Use this placeholder to add text or other content</a:t>
             </a:r>
           </a:p>
           <a:p>
             <a:pPr lvl="1"/>
             <a:r>
-              <a:rPr lang="en-US" dirty="0" smtClean="0"/>
+              <a:rPr lang="en-US" dirty="0"/>
               <a:t>Second level</a:t>
             </a:r>
           </a:p>
           <a:p>
             <a:pPr lvl="2"/>
             <a:r>
-              <a:rPr lang="en-US" dirty="0" smtClean="0"/>
+              <a:rPr lang="en-US" dirty="0"/>
               <a:t>Third level</a:t>
             </a:r>
           </a:p>
           <a:p>
             <a:pPr lvl="3"/>
             <a:r>
-              <a:rPr lang="en-US" dirty="0" smtClean="0"/>
+              <a:rPr lang="en-US" dirty="0"/>
               <a:t>Fourth level</a:t>
             </a:r>
           </a:p>
           <a:p>
             <a:pPr lvl="4"/>
             <a:r>
-              <a:rPr lang="en-US" dirty="0" smtClean="0"/>
+              <a:rPr lang="en-US" dirty="0"/>
               <a:t>Fifth level</a:t>
             </a:r>
           </a:p>
           <a:p>
             <a:pPr lvl="5"/>
             <a:r>
-              <a:rPr lang="en-US" dirty="0" smtClean="0"/>
+              <a:rPr lang="en-US" dirty="0"/>
               <a:t>Six</a:t>
             </a:r>
           </a:p>
           <a:p>
             <a:pPr lvl="6"/>
             <a:r>
-              <a:rPr lang="en-US" dirty="0" smtClean="0"/>
+              <a:rPr lang="en-US" dirty="0"/>
               <a:t>Seven</a:t>
             </a:r>
           </a:p>
           <a:p>
             <a:pPr lvl="7"/>
             <a:r>
-              <a:rPr lang="en-US" dirty="0" smtClean="0"/>
+              <a:rPr lang="en-US" dirty="0"/>
               <a:t>Eight</a:t>
             </a:r>
           </a:p>
           <a:p>
             <a:pPr lvl="8"/>
             <a:r>
-              <a:rPr lang="en-US" dirty="0" smtClean="0"/>
+              <a:rPr lang="en-US" dirty="0"/>
               <a:t>Nine</a:t>
             </a:r>
-            <a:endParaRPr lang="en-US" dirty="0"/>
           </a:p>
         </p:txBody>
       </p:sp>
@@ -10823,31 +10623,30 @@
           <a:p>
             <a:pPr lvl="0"/>
             <a:r>
-              <a:rPr lang="en-US" dirty="0" smtClean="0"/>
+              <a:rPr lang="en-US" dirty="0"/>
               <a:t>Use this placeholder to add text or other content</a:t>
             </a:r>
           </a:p>
           <a:p>
             <a:pPr lvl="1"/>
             <a:r>
-              <a:rPr lang="en-US" dirty="0" smtClean="0"/>
+              <a:rPr lang="en-US" dirty="0"/>
               <a:t>Second level</a:t>
             </a:r>
           </a:p>
           <a:p>
             <a:pPr lvl="2"/>
             <a:r>
-              <a:rPr lang="en-US" dirty="0" smtClean="0"/>
+              <a:rPr lang="en-US" dirty="0"/>
               <a:t>Third level</a:t>
             </a:r>
           </a:p>
           <a:p>
             <a:pPr lvl="3"/>
             <a:r>
-              <a:rPr lang="en-US" dirty="0" smtClean="0"/>
+              <a:rPr lang="en-US" dirty="0"/>
               <a:t>Fourth level</a:t>
             </a:r>
-            <a:endParaRPr lang="en-US" dirty="0"/>
           </a:p>
         </p:txBody>
       </p:sp>
@@ -11010,10 +10809,9 @@
           <a:p>
             <a:pPr lvl="0"/>
             <a:r>
-              <a:rPr lang="en-US" dirty="0" smtClean="0"/>
+              <a:rPr lang="en-US" dirty="0"/>
               <a:t>Heading</a:t>
             </a:r>
-            <a:endParaRPr lang="en-US" dirty="0"/>
           </a:p>
         </p:txBody>
       </p:sp>
@@ -11067,31 +10865,30 @@
           <a:p>
             <a:pPr lvl="0"/>
             <a:r>
-              <a:rPr lang="en-US" dirty="0" smtClean="0"/>
+              <a:rPr lang="en-US" dirty="0"/>
               <a:t>Use this placeholder to add text or other content</a:t>
             </a:r>
           </a:p>
           <a:p>
             <a:pPr lvl="1"/>
             <a:r>
-              <a:rPr lang="en-US" dirty="0" smtClean="0"/>
+              <a:rPr lang="en-US" dirty="0"/>
               <a:t>Second level</a:t>
             </a:r>
           </a:p>
           <a:p>
             <a:pPr lvl="2"/>
             <a:r>
-              <a:rPr lang="en-US" dirty="0" smtClean="0"/>
+              <a:rPr lang="en-US" dirty="0"/>
               <a:t>Third level</a:t>
             </a:r>
           </a:p>
           <a:p>
             <a:pPr lvl="3"/>
             <a:r>
-              <a:rPr lang="en-US" dirty="0" smtClean="0"/>
+              <a:rPr lang="en-US" dirty="0"/>
               <a:t>Fourth level</a:t>
             </a:r>
-            <a:endParaRPr lang="en-US" dirty="0"/>
           </a:p>
         </p:txBody>
       </p:sp>
@@ -11254,10 +11051,9 @@
           <a:p>
             <a:pPr lvl="0"/>
             <a:r>
-              <a:rPr lang="en-US" dirty="0" smtClean="0"/>
+              <a:rPr lang="en-US" dirty="0"/>
               <a:t>Heading</a:t>
             </a:r>
-            <a:endParaRPr lang="en-US" dirty="0"/>
           </a:p>
         </p:txBody>
       </p:sp>
@@ -11311,45 +11107,44 @@
           <a:p>
             <a:pPr lvl="0"/>
             <a:r>
-              <a:rPr lang="en-US" dirty="0" smtClean="0"/>
+              <a:rPr lang="en-US" dirty="0"/>
               <a:t>Use this placeholder to add text or other content</a:t>
             </a:r>
           </a:p>
           <a:p>
             <a:pPr lvl="1"/>
             <a:r>
-              <a:rPr lang="en-US" dirty="0" smtClean="0"/>
+              <a:rPr lang="en-US" dirty="0"/>
               <a:t>Second level</a:t>
             </a:r>
           </a:p>
           <a:p>
             <a:pPr lvl="2"/>
             <a:r>
-              <a:rPr lang="en-US" dirty="0" smtClean="0"/>
+              <a:rPr lang="en-US" dirty="0"/>
               <a:t>Third level</a:t>
             </a:r>
           </a:p>
           <a:p>
             <a:pPr lvl="3"/>
             <a:r>
-              <a:rPr lang="en-US" dirty="0" smtClean="0"/>
+              <a:rPr lang="en-US" dirty="0"/>
               <a:t>Fourth level</a:t>
             </a:r>
           </a:p>
           <a:p>
             <a:pPr lvl="4"/>
             <a:r>
-              <a:rPr lang="en-US" dirty="0" smtClean="0"/>
+              <a:rPr lang="en-US" dirty="0"/>
               <a:t>Fifth level</a:t>
             </a:r>
           </a:p>
           <a:p>
             <a:pPr lvl="5"/>
             <a:r>
-              <a:rPr lang="en-US" dirty="0" smtClean="0"/>
+              <a:rPr lang="en-US" dirty="0"/>
               <a:t>Six</a:t>
             </a:r>
-            <a:endParaRPr lang="en-US" dirty="0"/>
           </a:p>
         </p:txBody>
       </p:sp>
@@ -11370,7 +11165,7 @@
           <a:p>
             <a:fld id="{ECAA57DF-1C19-4726-AB84-014692BAD8F5}" type="datetimeFigureOut">
               <a:rPr lang="en-US" smtClean="0"/>
-              <a:t>12/10/2019</a:t>
+              <a:t>12/12/2019</a:t>
             </a:fld>
             <a:endParaRPr lang="en-US"/>
           </a:p>
@@ -11474,7 +11269,7 @@
           </a:lstStyle>
           <a:p>
             <a:r>
-              <a:rPr lang="en-US" smtClean="0"/>
+              <a:rPr lang="en-US"/>
               <a:t>Click icon to add picture</a:t>
             </a:r>
             <a:endParaRPr lang="en-US" dirty="0"/>
@@ -11491,7 +11286,7 @@
   <p:clrMapOvr>
     <a:masterClrMapping/>
   </p:clrMapOvr>
-  <p:extLst mod="1">
+  <p:extLst>
     <p:ext uri="{DCECCB84-F9BA-43D5-87BE-67443E8EF086}">
       <p15:sldGuideLst xmlns:p15="http://schemas.microsoft.com/office/powerpoint/2012/main">
         <p15:guide id="1" pos="9168" userDrawn="1">
@@ -11604,7 +11399,7 @@
           <a:lstStyle/>
           <a:p>
             <a:r>
-              <a:rPr lang="en-US" smtClean="0"/>
+              <a:rPr lang="en-US"/>
               <a:t>Click to edit Master title style</a:t>
             </a:r>
             <a:endParaRPr lang="en-US" dirty="0"/>
@@ -11638,35 +11433,35 @@
           <a:p>
             <a:pPr lvl="0"/>
             <a:r>
-              <a:rPr lang="en-US" smtClean="0"/>
+              <a:rPr lang="en-US"/>
               <a:t>Click to edit Master text styles</a:t>
             </a:r>
           </a:p>
           <a:p>
             <a:pPr lvl="1"/>
             <a:r>
-              <a:rPr lang="en-US" smtClean="0"/>
+              <a:rPr lang="en-US"/>
               <a:t>Second level</a:t>
             </a:r>
           </a:p>
           <a:p>
             <a:pPr lvl="2"/>
             <a:r>
-              <a:rPr lang="en-US" smtClean="0"/>
+              <a:rPr lang="en-US"/>
               <a:t>Third level</a:t>
             </a:r>
           </a:p>
           <a:p>
             <a:pPr lvl="3"/>
             <a:r>
-              <a:rPr lang="en-US" smtClean="0"/>
+              <a:rPr lang="en-US"/>
               <a:t>Fourth level</a:t>
             </a:r>
           </a:p>
           <a:p>
             <a:pPr lvl="4"/>
             <a:r>
-              <a:rPr lang="en-US" smtClean="0"/>
+              <a:rPr lang="en-US"/>
               <a:t>Fifth level</a:t>
             </a:r>
             <a:endParaRPr lang="en-US" dirty="0"/>
@@ -11709,7 +11504,7 @@
             <a:fld id="{ECAA57DF-1C19-4726-AB84-014692BAD8F5}" type="datetimeFigureOut">
               <a:rPr lang="en-US" smtClean="0"/>
               <a:pPr/>
-              <a:t>12/10/2019</a:t>
+              <a:t>12/12/2019</a:t>
             </a:fld>
             <a:endParaRPr lang="en-US"/>
           </a:p>
@@ -12212,7 +12007,7 @@
       </a:lvl9pPr>
     </p:otherStyle>
   </p:txStyles>
-  <p:extLst mod="1">
+  <p:extLst>
     <p:ext uri="{27BBF7A9-308A-43DC-89C8-2F10F3537804}">
       <p15:sldGuideLst xmlns:p15="http://schemas.microsoft.com/office/powerpoint/2012/main">
         <p15:guide id="1" orient="horz" pos="10368" userDrawn="1">
@@ -12268,16 +12063,20 @@
             <p:ph type="title"/>
           </p:nvPr>
         </p:nvSpPr>
-        <p:spPr/>
+        <p:spPr>
+          <a:xfrm>
+            <a:off x="22123" y="592786"/>
+            <a:ext cx="30175200" cy="2971740"/>
+          </a:xfrm>
+        </p:spPr>
         <p:txBody>
           <a:bodyPr/>
           <a:lstStyle/>
           <a:p>
             <a:r>
-              <a:rPr lang="en-US" dirty="0" smtClean="0"/>
+              <a:rPr lang="en-US" dirty="0"/>
               <a:t>IOT-BASED GREENHOUSE AUTOMATION</a:t>
             </a:r>
-            <a:endParaRPr lang="en-US" dirty="0"/>
           </a:p>
         </p:txBody>
       </p:sp>
@@ -12297,10 +12096,9 @@
           <a:lstStyle/>
           <a:p>
             <a:r>
-              <a:rPr lang="en-US" dirty="0" smtClean="0"/>
-              <a:t> | Your Name| Your name </a:t>
+              <a:rPr lang="en-US" dirty="0"/>
+              <a:t> | WATKIDOG JOACHIM | MUGISHA RONALD | LOCHA DERRICK | ACAA GLADYS OBOL </a:t>
             </a:r>
-            <a:endParaRPr lang="en-US" dirty="0"/>
           </a:p>
         </p:txBody>
       </p:sp>
@@ -12320,10 +12118,9 @@
           <a:lstStyle/>
           <a:p>
             <a:r>
-              <a:rPr lang="en-US" dirty="0" smtClean="0"/>
+              <a:rPr lang="en-US" dirty="0"/>
               <a:t>Problem </a:t>
             </a:r>
-            <a:endParaRPr lang="en-US" dirty="0"/>
           </a:p>
         </p:txBody>
       </p:sp>
@@ -12343,10 +12140,9 @@
           <a:lstStyle/>
           <a:p>
             <a:r>
-              <a:rPr lang="en-US" dirty="0" smtClean="0"/>
+              <a:rPr lang="en-US" dirty="0"/>
               <a:t>Insufficient food production due to increasing population and urbanization.</a:t>
             </a:r>
-            <a:endParaRPr lang="en-US" dirty="0"/>
           </a:p>
         </p:txBody>
       </p:sp>
@@ -12366,10 +12162,9 @@
           <a:lstStyle/>
           <a:p>
             <a:r>
-              <a:rPr lang="en-US" dirty="0" smtClean="0"/>
+              <a:rPr lang="en-US" dirty="0"/>
               <a:t>Project  Objectives</a:t>
             </a:r>
-            <a:endParaRPr lang="en-US" dirty="0"/>
           </a:p>
         </p:txBody>
       </p:sp>
@@ -12394,7 +12189,7 @@
               <a:buNone/>
             </a:pPr>
             <a:r>
-              <a:rPr lang="en-US" b="1" dirty="0" smtClean="0"/>
+              <a:rPr lang="en-US" b="1" dirty="0"/>
               <a:t>Main Objective</a:t>
             </a:r>
           </a:p>
@@ -12403,7 +12198,7 @@
               <a:buNone/>
             </a:pPr>
             <a:r>
-              <a:rPr lang="en-US" dirty="0" smtClean="0"/>
+              <a:rPr lang="en-US" dirty="0"/>
               <a:t>To increase food production with minimal labor through automation</a:t>
             </a:r>
           </a:p>
@@ -12411,48 +12206,43 @@
             <a:pPr marL="0" indent="0">
               <a:buNone/>
             </a:pPr>
-            <a:endParaRPr lang="en-US" dirty="0" smtClean="0"/>
+            <a:endParaRPr lang="en-US" dirty="0"/>
           </a:p>
           <a:p>
             <a:pPr marL="0" indent="0">
               <a:buNone/>
             </a:pPr>
             <a:r>
-              <a:rPr lang="en-US" b="1" dirty="0" smtClean="0"/>
+              <a:rPr lang="en-US" b="1" dirty="0"/>
               <a:t>Specific Objectives</a:t>
             </a:r>
-            <a:endParaRPr lang="en-US" b="1" dirty="0" smtClean="0"/>
           </a:p>
           <a:p>
             <a:r>
-              <a:rPr lang="en-US" dirty="0" smtClean="0"/>
-              <a:t>To </a:t>
+              <a:rPr lang="en-US" dirty="0"/>
+              <a:t>To study and analyze the current greenhouse systems.</a:t>
             </a:r>
+          </a:p>
+          <a:p>
             <a:r>
-              <a:rPr lang="en-US" dirty="0" smtClean="0"/>
-              <a:t>study and analyze the current greenhouse systems.</a:t>
-            </a:r>
-          </a:p>
-          <a:p>
-            <a:r>
-              <a:rPr lang="en-US" dirty="0" smtClean="0"/>
+              <a:rPr lang="en-US" dirty="0"/>
               <a:t>To design a miniature greenhouse, which is equipped with an automatic monitoring and controlling system.</a:t>
             </a:r>
           </a:p>
           <a:p>
             <a:r>
-              <a:rPr lang="en-US" dirty="0" smtClean="0"/>
+              <a:rPr lang="en-US" dirty="0"/>
               <a:t>To implement and test the system.</a:t>
             </a:r>
           </a:p>
           <a:p>
             <a:r>
-              <a:rPr lang="en-US" dirty="0" smtClean="0"/>
+              <a:rPr lang="en-US" dirty="0"/>
               <a:t>To constantly monitor and control the environmental conditions in the greenhouse to ensure it remains at preset temperature, light, moisture and humidity levels.</a:t>
             </a:r>
           </a:p>
           <a:p>
-            <a:endParaRPr lang="en-US" dirty="0" smtClean="0"/>
+            <a:endParaRPr lang="en-US" dirty="0"/>
           </a:p>
           <a:p>
             <a:pPr marL="0" indent="0">
@@ -12478,10 +12268,9 @@
           <a:lstStyle/>
           <a:p>
             <a:r>
-              <a:rPr lang="en-US" dirty="0" smtClean="0"/>
+              <a:rPr lang="en-US" dirty="0"/>
               <a:t>Project Requirements</a:t>
             </a:r>
-            <a:endParaRPr lang="en-US" dirty="0"/>
           </a:p>
         </p:txBody>
       </p:sp>
@@ -12501,16 +12290,27 @@
           <a:lstStyle/>
           <a:p>
             <a:r>
-              <a:rPr lang="en-US" dirty="0" smtClean="0"/>
-              <a:t>R1. </a:t>
+              <a:rPr lang="en-US" dirty="0"/>
+              <a:t>R1.The system must be able to detect temperature, light, moisture level, humidity within a greenhouse.</a:t>
             </a:r>
           </a:p>
           <a:p>
             <a:r>
-              <a:rPr lang="en-US" dirty="0" smtClean="0"/>
-              <a:t>R2.</a:t>
+              <a:rPr lang="en-US" dirty="0"/>
+              <a:t>R2. The system must store the data collected in a database.</a:t>
             </a:r>
-            <a:endParaRPr lang="en-US" dirty="0"/>
+          </a:p>
+          <a:p>
+            <a:r>
+              <a:rPr lang="en-US" dirty="0"/>
+              <a:t>R3. The system must use the data collected in the database to automatically control the conditions within a greenhouse.</a:t>
+            </a:r>
+          </a:p>
+          <a:p>
+            <a:r>
+              <a:rPr lang="en-US" dirty="0"/>
+              <a:t>R4. The system must be able to analyze the data collected.</a:t>
+            </a:r>
           </a:p>
         </p:txBody>
       </p:sp>
@@ -12530,10 +12330,9 @@
           <a:lstStyle/>
           <a:p>
             <a:r>
-              <a:rPr lang="en-US" dirty="0" smtClean="0"/>
+              <a:rPr lang="en-US" dirty="0"/>
               <a:t>Target Users</a:t>
             </a:r>
-            <a:endParaRPr lang="en-US" dirty="0"/>
           </a:p>
         </p:txBody>
       </p:sp>
@@ -12547,7 +12346,7 @@
             <p:ph sz="quarter" idx="26"/>
             <p:extLst>
               <p:ext uri="{D42A27DB-BD31-4B8C-83A1-F6EECF244321}">
-                <p14:modId xmlns:p14="http://schemas.microsoft.com/office/powerpoint/2010/main" val="494327394"/>
+                <p14:modId xmlns:p14="http://schemas.microsoft.com/office/powerpoint/2010/main" val="3609895274"/>
               </p:ext>
             </p:extLst>
           </p:nvPr>
@@ -12578,10 +12377,9 @@
           <a:lstStyle/>
           <a:p>
             <a:r>
-              <a:rPr lang="en-US" dirty="0" smtClean="0"/>
+              <a:rPr lang="en-US" dirty="0"/>
               <a:t>Project Design</a:t>
             </a:r>
-            <a:endParaRPr lang="en-US" dirty="0"/>
           </a:p>
         </p:txBody>
       </p:sp>
@@ -12601,10 +12399,9 @@
           <a:lstStyle/>
           <a:p>
             <a:r>
-              <a:rPr lang="en-US" dirty="0" smtClean="0"/>
+              <a:rPr lang="en-US" dirty="0"/>
               <a:t>Results</a:t>
             </a:r>
-            <a:endParaRPr lang="en-US" dirty="0"/>
           </a:p>
         </p:txBody>
       </p:sp>
@@ -12649,10 +12446,9 @@
           <a:lstStyle/>
           <a:p>
             <a:r>
-              <a:rPr lang="en-US" dirty="0" smtClean="0"/>
+              <a:rPr lang="en-US" dirty="0"/>
               <a:t>Future Work</a:t>
             </a:r>
-            <a:endParaRPr lang="en-US" dirty="0"/>
           </a:p>
         </p:txBody>
       </p:sp>
@@ -12672,22 +12468,21 @@
           <a:lstStyle/>
           <a:p>
             <a:r>
-              <a:rPr lang="en-US" dirty="0" smtClean="0"/>
+              <a:rPr lang="en-US" dirty="0"/>
               <a:t>Observation 1</a:t>
             </a:r>
           </a:p>
           <a:p>
             <a:r>
-              <a:rPr lang="en-US" dirty="0" smtClean="0"/>
+              <a:rPr lang="en-US" dirty="0"/>
               <a:t>Observation 2</a:t>
             </a:r>
           </a:p>
           <a:p>
             <a:r>
-              <a:rPr lang="en-US" dirty="0" smtClean="0"/>
+              <a:rPr lang="en-US" dirty="0"/>
               <a:t>Observation 3</a:t>
             </a:r>
-            <a:endParaRPr lang="en-US" dirty="0"/>
           </a:p>
         </p:txBody>
       </p:sp>
@@ -12707,10 +12502,9 @@
           <a:lstStyle/>
           <a:p>
             <a:r>
-              <a:rPr lang="en-US" dirty="0" smtClean="0"/>
+              <a:rPr lang="en-US" dirty="0"/>
               <a:t>Results</a:t>
             </a:r>
-            <a:endParaRPr lang="en-US" dirty="0"/>
           </a:p>
         </p:txBody>
       </p:sp>
@@ -12755,27 +12549,26 @@
           <a:lstStyle/>
           <a:p>
             <a:r>
-              <a:rPr lang="en-US" dirty="0" smtClean="0"/>
+              <a:rPr lang="en-US" dirty="0"/>
               <a:t>Include key screenshots of your system and </a:t>
             </a:r>
             <a:r>
-              <a:rPr lang="en-US" dirty="0" err="1" smtClean="0"/>
+              <a:rPr lang="en-US" dirty="0" err="1"/>
               <a:t>visualisations</a:t>
             </a:r>
-            <a:endParaRPr lang="en-US" dirty="0" smtClean="0"/>
+            <a:endParaRPr lang="en-US" dirty="0"/>
           </a:p>
           <a:p>
             <a:r>
-              <a:rPr lang="en-US" dirty="0" smtClean="0"/>
+              <a:rPr lang="en-US" dirty="0"/>
               <a:t>Result 2</a:t>
             </a:r>
           </a:p>
           <a:p>
             <a:r>
-              <a:rPr lang="en-US" dirty="0" smtClean="0"/>
+              <a:rPr lang="en-US" dirty="0"/>
               <a:t>Result 3</a:t>
             </a:r>
-            <a:endParaRPr lang="en-US" dirty="0"/>
           </a:p>
         </p:txBody>
       </p:sp>
@@ -12795,10 +12588,9 @@
           <a:lstStyle/>
           <a:p>
             <a:r>
-              <a:rPr lang="en-US" dirty="0" smtClean="0"/>
+              <a:rPr lang="en-US" dirty="0"/>
               <a:t>Conclusion</a:t>
             </a:r>
-            <a:endParaRPr lang="en-US" dirty="0"/>
           </a:p>
         </p:txBody>
       </p:sp>
@@ -12818,13 +12610,13 @@
           <a:lstStyle/>
           <a:p>
             <a:r>
-              <a:rPr lang="en-US" smtClean="0"/>
+              <a:rPr lang="en-US"/>
               <a:t>Brief summary of what you discovered based on results</a:t>
             </a:r>
           </a:p>
           <a:p>
             <a:r>
-              <a:rPr lang="en-US" smtClean="0"/>
+              <a:rPr lang="en-US"/>
               <a:t>Indicate and explain whether or not the data supports your hypothesis</a:t>
             </a:r>
             <a:endParaRPr lang="en-US" dirty="0"/>
@@ -12847,10 +12639,9 @@
           <a:lstStyle/>
           <a:p>
             <a:r>
-              <a:rPr lang="en-US" dirty="0" smtClean="0"/>
+              <a:rPr lang="en-US" dirty="0"/>
               <a:t>References</a:t>
             </a:r>
-            <a:endParaRPr lang="en-US" dirty="0"/>
           </a:p>
         </p:txBody>
       </p:sp>
@@ -12870,7 +12661,7 @@
           <a:lstStyle/>
           <a:p>
             <a:r>
-              <a:rPr lang="en-US" smtClean="0"/>
+              <a:rPr lang="en-US"/>
               <a:t>Include print and electronic sources in alphabetical order</a:t>
             </a:r>
             <a:endParaRPr lang="en-US" dirty="0"/>
@@ -12893,8 +12684,8 @@
         </p:blipFill>
         <p:spPr>
           <a:xfrm>
-            <a:off x="25164680" y="-30922"/>
-            <a:ext cx="18726521" cy="3797404"/>
+            <a:off x="28788852" y="-30922"/>
+            <a:ext cx="15102349" cy="3797404"/>
           </a:xfrm>
           <a:prstGeom prst="rect">
             <a:avLst/>
@@ -12930,13 +12721,6 @@
   <p:clrMapOvr>
     <a:masterClrMapping/>
   </p:clrMapOvr>
-  <p:timing>
-    <p:tnLst>
-      <p:par>
-        <p:cTn id="1" dur="indefinite" restart="never" nodeType="tmRoot"/>
-      </p:par>
-    </p:tnLst>
-  </p:timing>
 </p:sld>
 </file>
 

</xml_diff>